<commit_message>
Commit ngày 25/9/2022 lần 1
</commit_message>
<xml_diff>
--- a/Powerpoint cơ bản.pptx
+++ b/Powerpoint cơ bản.pptx
@@ -5,10 +5,10 @@
     <p:sldMasterId id="2147483648" r:id="rId1"/>
   </p:sldMasterIdLst>
   <p:notesMasterIdLst>
-    <p:notesMasterId r:id="rId14"/>
+    <p:notesMasterId r:id="rId17"/>
   </p:notesMasterIdLst>
   <p:handoutMasterIdLst>
-    <p:handoutMasterId r:id="rId15"/>
+    <p:handoutMasterId r:id="rId18"/>
   </p:handoutMasterIdLst>
   <p:sldIdLst>
     <p:sldId id="256" r:id="rId2"/>
@@ -23,6 +23,9 @@
     <p:sldId id="265" r:id="rId11"/>
     <p:sldId id="266" r:id="rId12"/>
     <p:sldId id="267" r:id="rId13"/>
+    <p:sldId id="268" r:id="rId14"/>
+    <p:sldId id="269" r:id="rId15"/>
+    <p:sldId id="270" r:id="rId16"/>
   </p:sldIdLst>
   <p:sldSz cx="12192000" cy="6858000"/>
   <p:notesSz cx="6858000" cy="9144000"/>
@@ -142,12 +145,15 @@
         <p14:section name="Slide hoàn chỉnh đầu tiên" id="{E43179C1-FB52-43C3-8240-F10928E3A921}">
           <p14:sldIdLst>
             <p14:sldId id="267"/>
+            <p14:sldId id="268"/>
+            <p14:sldId id="269"/>
+            <p14:sldId id="270"/>
           </p14:sldIdLst>
         </p14:section>
       </p14:sectionLst>
     </p:ext>
     <p:ext uri="{EFAFB233-063F-42B5-8137-9DF3F51BA10A}">
-      <p15:sldGuideLst xmlns:p15="http://schemas.microsoft.com/office/powerpoint/2012/main" xmlns=""/>
+      <p15:sldGuideLst xmlns="" xmlns:p15="http://schemas.microsoft.com/office/powerpoint/2012/main"/>
     </p:ext>
   </p:extLst>
 </p:presentation>
@@ -235,7 +241,7 @@
           <a:p>
             <a:fld id="{C7518CE1-D1CB-4FA9-B0A3-604DBFBB325F}" type="datetimeFigureOut">
               <a:rPr lang="en-US" smtClean="0"/>
-              <a:t>9/24/2022</a:t>
+              <a:t>9/25/2022</a:t>
             </a:fld>
             <a:endParaRPr lang="en-US"/>
           </a:p>
@@ -400,7 +406,7 @@
           <a:p>
             <a:fld id="{FF127186-9FC2-4AFB-8263-FD27C3BC53F0}" type="datetimeFigureOut">
               <a:rPr lang="en-US" smtClean="0"/>
-              <a:t>9/24/2022</a:t>
+              <a:t>9/25/2022</a:t>
             </a:fld>
             <a:endParaRPr lang="en-US"/>
           </a:p>
@@ -925,7 +931,7 @@
           <a:p>
             <a:fld id="{CF4B45C1-41D8-4316-9FDD-2ADADC423E48}" type="datetimeFigureOut">
               <a:rPr lang="en-US" smtClean="0"/>
-              <a:t>9/24/2022</a:t>
+              <a:t>9/25/2022</a:t>
             </a:fld>
             <a:endParaRPr lang="en-US"/>
           </a:p>
@@ -1095,7 +1101,7 @@
           <a:p>
             <a:fld id="{CF4B45C1-41D8-4316-9FDD-2ADADC423E48}" type="datetimeFigureOut">
               <a:rPr lang="en-US" smtClean="0"/>
-              <a:t>9/24/2022</a:t>
+              <a:t>9/25/2022</a:t>
             </a:fld>
             <a:endParaRPr lang="en-US"/>
           </a:p>
@@ -1275,7 +1281,7 @@
           <a:p>
             <a:fld id="{CF4B45C1-41D8-4316-9FDD-2ADADC423E48}" type="datetimeFigureOut">
               <a:rPr lang="en-US" smtClean="0"/>
-              <a:t>9/24/2022</a:t>
+              <a:t>9/25/2022</a:t>
             </a:fld>
             <a:endParaRPr lang="en-US"/>
           </a:p>
@@ -1445,7 +1451,7 @@
           <a:p>
             <a:fld id="{CF4B45C1-41D8-4316-9FDD-2ADADC423E48}" type="datetimeFigureOut">
               <a:rPr lang="en-US" smtClean="0"/>
-              <a:t>9/24/2022</a:t>
+              <a:t>9/25/2022</a:t>
             </a:fld>
             <a:endParaRPr lang="en-US"/>
           </a:p>
@@ -1691,7 +1697,7 @@
           <a:p>
             <a:fld id="{CF4B45C1-41D8-4316-9FDD-2ADADC423E48}" type="datetimeFigureOut">
               <a:rPr lang="en-US" smtClean="0"/>
-              <a:t>9/24/2022</a:t>
+              <a:t>9/25/2022</a:t>
             </a:fld>
             <a:endParaRPr lang="en-US"/>
           </a:p>
@@ -1923,7 +1929,7 @@
           <a:p>
             <a:fld id="{CF4B45C1-41D8-4316-9FDD-2ADADC423E48}" type="datetimeFigureOut">
               <a:rPr lang="en-US" smtClean="0"/>
-              <a:t>9/24/2022</a:t>
+              <a:t>9/25/2022</a:t>
             </a:fld>
             <a:endParaRPr lang="en-US"/>
           </a:p>
@@ -2290,7 +2296,7 @@
           <a:p>
             <a:fld id="{CF4B45C1-41D8-4316-9FDD-2ADADC423E48}" type="datetimeFigureOut">
               <a:rPr lang="en-US" smtClean="0"/>
-              <a:t>9/24/2022</a:t>
+              <a:t>9/25/2022</a:t>
             </a:fld>
             <a:endParaRPr lang="en-US"/>
           </a:p>
@@ -2408,7 +2414,7 @@
           <a:p>
             <a:fld id="{CF4B45C1-41D8-4316-9FDD-2ADADC423E48}" type="datetimeFigureOut">
               <a:rPr lang="en-US" smtClean="0"/>
-              <a:t>9/24/2022</a:t>
+              <a:t>9/25/2022</a:t>
             </a:fld>
             <a:endParaRPr lang="en-US"/>
           </a:p>
@@ -2503,7 +2509,7 @@
           <a:p>
             <a:fld id="{CF4B45C1-41D8-4316-9FDD-2ADADC423E48}" type="datetimeFigureOut">
               <a:rPr lang="en-US" smtClean="0"/>
-              <a:t>9/24/2022</a:t>
+              <a:t>9/25/2022</a:t>
             </a:fld>
             <a:endParaRPr lang="en-US"/>
           </a:p>
@@ -2780,7 +2786,7 @@
           <a:p>
             <a:fld id="{CF4B45C1-41D8-4316-9FDD-2ADADC423E48}" type="datetimeFigureOut">
               <a:rPr lang="en-US" smtClean="0"/>
-              <a:t>9/24/2022</a:t>
+              <a:t>9/25/2022</a:t>
             </a:fld>
             <a:endParaRPr lang="en-US"/>
           </a:p>
@@ -3033,7 +3039,7 @@
           <a:p>
             <a:fld id="{CF4B45C1-41D8-4316-9FDD-2ADADC423E48}" type="datetimeFigureOut">
               <a:rPr lang="en-US" smtClean="0"/>
-              <a:t>9/24/2022</a:t>
+              <a:t>9/25/2022</a:t>
             </a:fld>
             <a:endParaRPr lang="en-US"/>
           </a:p>
@@ -3246,7 +3252,7 @@
           <a:p>
             <a:fld id="{CF4B45C1-41D8-4316-9FDD-2ADADC423E48}" type="datetimeFigureOut">
               <a:rPr lang="en-US" smtClean="0"/>
-              <a:t>9/24/2022</a:t>
+              <a:t>9/25/2022</a:t>
             </a:fld>
             <a:endParaRPr lang="en-US"/>
           </a:p>
@@ -4139,29 +4145,20 @@
           <a:prstGeom prst="rect">
             <a:avLst/>
           </a:prstGeom>
-          <a:gradFill>
+          <a:gradFill flip="none" rotWithShape="1">
             <a:gsLst>
-              <a:gs pos="0">
-                <a:schemeClr val="accent1">
-                  <a:tint val="66000"/>
-                  <a:satMod val="160000"/>
-                  <a:alpha val="40000"/>
-                </a:schemeClr>
-              </a:gs>
-              <a:gs pos="85000">
-                <a:schemeClr val="accent1">
-                  <a:tint val="44500"/>
-                  <a:satMod val="160000"/>
-                </a:schemeClr>
+              <a:gs pos="7000">
+                <a:srgbClr val="33E49C">
+                  <a:lumMod val="60000"/>
+                  <a:alpha val="39000"/>
+                </a:srgbClr>
               </a:gs>
               <a:gs pos="100000">
-                <a:schemeClr val="accent1">
-                  <a:tint val="23500"/>
-                  <a:satMod val="160000"/>
-                </a:schemeClr>
+                <a:srgbClr val="103945"/>
               </a:gs>
             </a:gsLst>
-            <a:lin ang="2700000" scaled="1"/>
+            <a:lin ang="13500000" scaled="1"/>
+            <a:tileRect/>
           </a:gradFill>
           <a:ln>
             <a:gradFill flip="none" rotWithShape="1">
@@ -4216,6 +4213,120 @@
           </a:p>
         </p:txBody>
       </p:sp>
+      <p:grpSp>
+        <p:nvGrpSpPr>
+          <p:cNvPr id="3" name="Group 2"/>
+          <p:cNvGrpSpPr/>
+          <p:nvPr/>
+        </p:nvGrpSpPr>
+        <p:grpSpPr>
+          <a:xfrm>
+            <a:off x="2342439" y="2619375"/>
+            <a:ext cx="7639050" cy="1352550"/>
+            <a:chOff x="2476500" y="2552700"/>
+            <a:chExt cx="7639050" cy="1352550"/>
+          </a:xfrm>
+        </p:grpSpPr>
+        <p:sp>
+          <p:nvSpPr>
+            <p:cNvPr id="6" name="Rectangle 5"/>
+            <p:cNvSpPr/>
+            <p:nvPr/>
+          </p:nvSpPr>
+          <p:spPr>
+            <a:xfrm rot="10800000">
+              <a:off x="2476500" y="2552700"/>
+              <a:ext cx="7639050" cy="1352550"/>
+            </a:xfrm>
+            <a:prstGeom prst="rect">
+              <a:avLst/>
+            </a:prstGeom>
+            <a:gradFill flip="none" rotWithShape="1">
+              <a:gsLst>
+                <a:gs pos="7000">
+                  <a:srgbClr val="33E49C">
+                    <a:lumMod val="60000"/>
+                    <a:alpha val="39000"/>
+                  </a:srgbClr>
+                </a:gs>
+                <a:gs pos="100000">
+                  <a:srgbClr val="103945"/>
+                </a:gs>
+              </a:gsLst>
+              <a:lin ang="13500000" scaled="1"/>
+              <a:tileRect/>
+            </a:gradFill>
+            <a:ln w="3175">
+              <a:noFill/>
+            </a:ln>
+          </p:spPr>
+          <p:style>
+            <a:lnRef idx="2">
+              <a:schemeClr val="accent1">
+                <a:shade val="50000"/>
+              </a:schemeClr>
+            </a:lnRef>
+            <a:fillRef idx="1">
+              <a:schemeClr val="accent1"/>
+            </a:fillRef>
+            <a:effectRef idx="0">
+              <a:schemeClr val="accent1"/>
+            </a:effectRef>
+            <a:fontRef idx="minor">
+              <a:schemeClr val="lt1"/>
+            </a:fontRef>
+          </p:style>
+          <p:txBody>
+            <a:bodyPr rtlCol="0" anchor="ctr"/>
+            <a:lstStyle/>
+            <a:p>
+              <a:pPr algn="ctr"/>
+              <a:endParaRPr lang="en-US" dirty="0"/>
+            </a:p>
+          </p:txBody>
+        </p:sp>
+        <p:sp>
+          <p:nvSpPr>
+            <p:cNvPr id="2" name="TextBox 1"/>
+            <p:cNvSpPr txBox="1"/>
+            <p:nvPr/>
+          </p:nvSpPr>
+          <p:spPr>
+            <a:xfrm>
+              <a:off x="4476750" y="2905809"/>
+              <a:ext cx="3638550" cy="646331"/>
+            </a:xfrm>
+            <a:prstGeom prst="rect">
+              <a:avLst/>
+            </a:prstGeom>
+            <a:noFill/>
+          </p:spPr>
+          <p:txBody>
+            <a:bodyPr wrap="square" rtlCol="0">
+              <a:spAutoFit/>
+            </a:bodyPr>
+            <a:lstStyle/>
+            <a:p>
+              <a:pPr algn="ctr"/>
+              <a:r>
+                <a:rPr lang="en-US" sz="3600" dirty="0" smtClean="0">
+                  <a:solidFill>
+                    <a:schemeClr val="bg1"/>
+                  </a:solidFill>
+                  <a:latin typeface="Euclid" pitchFamily="18" charset="0"/>
+                </a:rPr>
+                <a:t>Sea – Biển cả</a:t>
+              </a:r>
+              <a:endParaRPr lang="en-US" sz="3600" dirty="0">
+                <a:solidFill>
+                  <a:schemeClr val="bg1"/>
+                </a:solidFill>
+                <a:latin typeface="Euclid" pitchFamily="18" charset="0"/>
+              </a:endParaRPr>
+            </a:p>
+          </p:txBody>
+        </p:sp>
+      </p:grpSp>
     </p:spTree>
     <p:extLst>
       <p:ext uri="{BB962C8B-B14F-4D97-AF65-F5344CB8AC3E}">
@@ -4233,6 +4344,650 @@
       </p:par>
     </p:tnLst>
   </p:timing>
+</p:sld>
+</file>
+
+<file path=ppt/slides/slide13.xml><?xml version="1.0" encoding="utf-8"?>
+<p:sld xmlns:a="http://schemas.openxmlformats.org/drawingml/2006/main" xmlns:r="http://schemas.openxmlformats.org/officeDocument/2006/relationships" xmlns:p="http://schemas.openxmlformats.org/presentationml/2006/main">
+  <p:cSld>
+    <p:spTree>
+      <p:nvGrpSpPr>
+        <p:cNvPr id="1" name=""/>
+        <p:cNvGrpSpPr/>
+        <p:nvPr/>
+      </p:nvGrpSpPr>
+      <p:grpSpPr>
+        <a:xfrm>
+          <a:off x="0" y="0"/>
+          <a:ext cx="0" cy="0"/>
+          <a:chOff x="0" y="0"/>
+          <a:chExt cx="0" cy="0"/>
+        </a:xfrm>
+      </p:grpSpPr>
+      <p:grpSp>
+        <p:nvGrpSpPr>
+          <p:cNvPr id="4" name="Group 3"/>
+          <p:cNvGrpSpPr/>
+          <p:nvPr/>
+        </p:nvGrpSpPr>
+        <p:grpSpPr>
+          <a:xfrm>
+            <a:off x="0" y="2"/>
+            <a:ext cx="4876800" cy="4552950"/>
+            <a:chOff x="2476500" y="2552700"/>
+            <a:chExt cx="7639050" cy="1352550"/>
+          </a:xfrm>
+        </p:grpSpPr>
+        <p:sp>
+          <p:nvSpPr>
+            <p:cNvPr id="5" name="Rectangle 4"/>
+            <p:cNvSpPr/>
+            <p:nvPr/>
+          </p:nvSpPr>
+          <p:spPr>
+            <a:xfrm rot="10800000">
+              <a:off x="2476500" y="2552700"/>
+              <a:ext cx="7639050" cy="1352550"/>
+            </a:xfrm>
+            <a:prstGeom prst="rect">
+              <a:avLst/>
+            </a:prstGeom>
+            <a:gradFill flip="none" rotWithShape="1">
+              <a:gsLst>
+                <a:gs pos="7000">
+                  <a:srgbClr val="33E49C">
+                    <a:lumMod val="60000"/>
+                    <a:alpha val="39000"/>
+                  </a:srgbClr>
+                </a:gs>
+                <a:gs pos="100000">
+                  <a:srgbClr val="103945"/>
+                </a:gs>
+              </a:gsLst>
+              <a:lin ang="13500000" scaled="1"/>
+              <a:tileRect/>
+            </a:gradFill>
+            <a:ln w="3175">
+              <a:noFill/>
+            </a:ln>
+          </p:spPr>
+          <p:style>
+            <a:lnRef idx="2">
+              <a:schemeClr val="accent1">
+                <a:shade val="50000"/>
+              </a:schemeClr>
+            </a:lnRef>
+            <a:fillRef idx="1">
+              <a:schemeClr val="accent1"/>
+            </a:fillRef>
+            <a:effectRef idx="0">
+              <a:schemeClr val="accent1"/>
+            </a:effectRef>
+            <a:fontRef idx="minor">
+              <a:schemeClr val="lt1"/>
+            </a:fontRef>
+          </p:style>
+          <p:txBody>
+            <a:bodyPr rtlCol="0" anchor="ctr"/>
+            <a:lstStyle/>
+            <a:p>
+              <a:pPr algn="ctr"/>
+              <a:endParaRPr lang="en-US" dirty="0"/>
+            </a:p>
+          </p:txBody>
+        </p:sp>
+        <p:sp>
+          <p:nvSpPr>
+            <p:cNvPr id="6" name="TextBox 5"/>
+            <p:cNvSpPr txBox="1"/>
+            <p:nvPr/>
+          </p:nvSpPr>
+          <p:spPr>
+            <a:xfrm>
+              <a:off x="4476750" y="2905809"/>
+              <a:ext cx="3638550" cy="646331"/>
+            </a:xfrm>
+            <a:prstGeom prst="rect">
+              <a:avLst/>
+            </a:prstGeom>
+            <a:noFill/>
+          </p:spPr>
+          <p:txBody>
+            <a:bodyPr wrap="square" rtlCol="0">
+              <a:spAutoFit/>
+            </a:bodyPr>
+            <a:lstStyle/>
+            <a:p>
+              <a:pPr algn="ctr"/>
+              <a:r>
+                <a:rPr lang="en-US" sz="3600" dirty="0" smtClean="0">
+                  <a:solidFill>
+                    <a:schemeClr val="bg1"/>
+                  </a:solidFill>
+                  <a:latin typeface="Euclid" pitchFamily="18" charset="0"/>
+                </a:rPr>
+                <a:t>Sea – Biển cả</a:t>
+              </a:r>
+              <a:endParaRPr lang="en-US" sz="3600" dirty="0">
+                <a:solidFill>
+                  <a:schemeClr val="bg1"/>
+                </a:solidFill>
+                <a:latin typeface="Euclid" pitchFamily="18" charset="0"/>
+              </a:endParaRPr>
+            </a:p>
+          </p:txBody>
+        </p:sp>
+      </p:grpSp>
+      <p:grpSp>
+        <p:nvGrpSpPr>
+          <p:cNvPr id="7" name="Group 6"/>
+          <p:cNvGrpSpPr/>
+          <p:nvPr/>
+        </p:nvGrpSpPr>
+        <p:grpSpPr>
+          <a:xfrm>
+            <a:off x="4876800" y="4552953"/>
+            <a:ext cx="7315200" cy="2305047"/>
+            <a:chOff x="2476500" y="2552700"/>
+            <a:chExt cx="7639050" cy="1352550"/>
+          </a:xfrm>
+        </p:grpSpPr>
+        <p:sp>
+          <p:nvSpPr>
+            <p:cNvPr id="8" name="Rectangle 7"/>
+            <p:cNvSpPr/>
+            <p:nvPr/>
+          </p:nvSpPr>
+          <p:spPr>
+            <a:xfrm rot="10800000">
+              <a:off x="2476500" y="2552700"/>
+              <a:ext cx="7639050" cy="1352550"/>
+            </a:xfrm>
+            <a:prstGeom prst="rect">
+              <a:avLst/>
+            </a:prstGeom>
+            <a:gradFill flip="none" rotWithShape="1">
+              <a:gsLst>
+                <a:gs pos="7000">
+                  <a:srgbClr val="33E49C">
+                    <a:lumMod val="60000"/>
+                    <a:alpha val="39000"/>
+                  </a:srgbClr>
+                </a:gs>
+                <a:gs pos="100000">
+                  <a:srgbClr val="103945"/>
+                </a:gs>
+              </a:gsLst>
+              <a:lin ang="13500000" scaled="1"/>
+              <a:tileRect/>
+            </a:gradFill>
+            <a:ln w="3175">
+              <a:noFill/>
+            </a:ln>
+          </p:spPr>
+          <p:style>
+            <a:lnRef idx="2">
+              <a:schemeClr val="accent1">
+                <a:shade val="50000"/>
+              </a:schemeClr>
+            </a:lnRef>
+            <a:fillRef idx="1">
+              <a:schemeClr val="accent1"/>
+            </a:fillRef>
+            <a:effectRef idx="0">
+              <a:schemeClr val="accent1"/>
+            </a:effectRef>
+            <a:fontRef idx="minor">
+              <a:schemeClr val="lt1"/>
+            </a:fontRef>
+          </p:style>
+          <p:txBody>
+            <a:bodyPr rtlCol="0" anchor="ctr"/>
+            <a:lstStyle/>
+            <a:p>
+              <a:pPr algn="ctr"/>
+              <a:endParaRPr lang="en-US" dirty="0"/>
+            </a:p>
+          </p:txBody>
+        </p:sp>
+        <p:sp>
+          <p:nvSpPr>
+            <p:cNvPr id="9" name="TextBox 8"/>
+            <p:cNvSpPr txBox="1"/>
+            <p:nvPr/>
+          </p:nvSpPr>
+          <p:spPr>
+            <a:xfrm>
+              <a:off x="4476750" y="2905809"/>
+              <a:ext cx="3638550" cy="379253"/>
+            </a:xfrm>
+            <a:prstGeom prst="rect">
+              <a:avLst/>
+            </a:prstGeom>
+            <a:noFill/>
+          </p:spPr>
+          <p:txBody>
+            <a:bodyPr wrap="square" rtlCol="0">
+              <a:spAutoFit/>
+            </a:bodyPr>
+            <a:lstStyle/>
+            <a:p>
+              <a:pPr algn="ctr"/>
+              <a:endParaRPr lang="en-US" sz="3600" dirty="0">
+                <a:solidFill>
+                  <a:schemeClr val="bg1"/>
+                </a:solidFill>
+                <a:latin typeface="Euclid" pitchFamily="18" charset="0"/>
+              </a:endParaRPr>
+            </a:p>
+          </p:txBody>
+        </p:sp>
+      </p:grpSp>
+      <p:pic>
+        <p:nvPicPr>
+          <p:cNvPr id="10" name="Picture 2" descr="E:\Download\nature-wallpaper-7461792.jpg"/>
+          <p:cNvPicPr>
+            <a:picLocks noChangeAspect="1" noChangeArrowheads="1"/>
+          </p:cNvPicPr>
+          <p:nvPr/>
+        </p:nvPicPr>
+        <p:blipFill rotWithShape="1">
+          <a:blip r:embed="rId2" cstate="print">
+            <a:extLst>
+              <a:ext uri="{28A0092B-C50C-407E-A947-70E740481C1C}">
+                <a14:useLocalDpi xmlns:a14="http://schemas.microsoft.com/office/drawing/2010/main" val="0"/>
+              </a:ext>
+            </a:extLst>
+          </a:blip>
+          <a:srcRect t="10028" r="20661" b="10413"/>
+          <a:stretch/>
+        </p:blipFill>
+        <p:spPr bwMode="auto">
+          <a:xfrm>
+            <a:off x="4876801" y="0"/>
+            <a:ext cx="7315200" cy="4584662"/>
+          </a:xfrm>
+          <a:prstGeom prst="rect">
+            <a:avLst/>
+          </a:prstGeom>
+          <a:noFill/>
+          <a:extLst>
+            <a:ext uri="{909E8E84-426E-40DD-AFC4-6F175D3DCCD1}">
+              <a14:hiddenFill xmlns:a14="http://schemas.microsoft.com/office/drawing/2010/main">
+                <a:solidFill>
+                  <a:srgbClr val="FFFFFF"/>
+                </a:solidFill>
+              </a14:hiddenFill>
+            </a:ext>
+          </a:extLst>
+        </p:spPr>
+      </p:pic>
+    </p:spTree>
+    <p:extLst>
+      <p:ext uri="{BB962C8B-B14F-4D97-AF65-F5344CB8AC3E}">
+        <p14:creationId xmlns:p14="http://schemas.microsoft.com/office/powerpoint/2010/main" val="265280957"/>
+      </p:ext>
+    </p:extLst>
+  </p:cSld>
+  <p:clrMapOvr>
+    <a:masterClrMapping/>
+  </p:clrMapOvr>
+</p:sld>
+</file>
+
+<file path=ppt/slides/slide14.xml><?xml version="1.0" encoding="utf-8"?>
+<p:sld xmlns:a="http://schemas.openxmlformats.org/drawingml/2006/main" xmlns:r="http://schemas.openxmlformats.org/officeDocument/2006/relationships" xmlns:p="http://schemas.openxmlformats.org/presentationml/2006/main">
+  <p:cSld>
+    <p:spTree>
+      <p:nvGrpSpPr>
+        <p:cNvPr id="1" name=""/>
+        <p:cNvGrpSpPr/>
+        <p:nvPr/>
+      </p:nvGrpSpPr>
+      <p:grpSpPr>
+        <a:xfrm>
+          <a:off x="0" y="0"/>
+          <a:ext cx="0" cy="0"/>
+          <a:chOff x="0" y="0"/>
+          <a:chExt cx="0" cy="0"/>
+        </a:xfrm>
+      </p:grpSpPr>
+      <p:grpSp>
+        <p:nvGrpSpPr>
+          <p:cNvPr id="4" name="Group 3"/>
+          <p:cNvGrpSpPr/>
+          <p:nvPr/>
+        </p:nvGrpSpPr>
+        <p:grpSpPr>
+          <a:xfrm>
+            <a:off x="0" y="2"/>
+            <a:ext cx="4876800" cy="3788840"/>
+            <a:chOff x="2476500" y="2552700"/>
+            <a:chExt cx="7639050" cy="1352550"/>
+          </a:xfrm>
+        </p:grpSpPr>
+        <p:sp>
+          <p:nvSpPr>
+            <p:cNvPr id="5" name="Rectangle 4"/>
+            <p:cNvSpPr/>
+            <p:nvPr/>
+          </p:nvSpPr>
+          <p:spPr>
+            <a:xfrm rot="10800000">
+              <a:off x="2476500" y="2552700"/>
+              <a:ext cx="7639050" cy="1352550"/>
+            </a:xfrm>
+            <a:prstGeom prst="rect">
+              <a:avLst/>
+            </a:prstGeom>
+            <a:gradFill flip="none" rotWithShape="1">
+              <a:gsLst>
+                <a:gs pos="7000">
+                  <a:srgbClr val="33E49C">
+                    <a:lumMod val="60000"/>
+                    <a:alpha val="39000"/>
+                  </a:srgbClr>
+                </a:gs>
+                <a:gs pos="100000">
+                  <a:srgbClr val="103945"/>
+                </a:gs>
+              </a:gsLst>
+              <a:lin ang="13500000" scaled="1"/>
+              <a:tileRect/>
+            </a:gradFill>
+            <a:ln w="3175">
+              <a:noFill/>
+            </a:ln>
+          </p:spPr>
+          <p:style>
+            <a:lnRef idx="2">
+              <a:schemeClr val="accent1">
+                <a:shade val="50000"/>
+              </a:schemeClr>
+            </a:lnRef>
+            <a:fillRef idx="1">
+              <a:schemeClr val="accent1"/>
+            </a:fillRef>
+            <a:effectRef idx="0">
+              <a:schemeClr val="accent1"/>
+            </a:effectRef>
+            <a:fontRef idx="minor">
+              <a:schemeClr val="lt1"/>
+            </a:fontRef>
+          </p:style>
+          <p:txBody>
+            <a:bodyPr rtlCol="0" anchor="ctr"/>
+            <a:lstStyle/>
+            <a:p>
+              <a:pPr algn="ctr"/>
+              <a:endParaRPr lang="en-US" dirty="0"/>
+            </a:p>
+          </p:txBody>
+        </p:sp>
+        <p:sp>
+          <p:nvSpPr>
+            <p:cNvPr id="6" name="TextBox 5"/>
+            <p:cNvSpPr txBox="1"/>
+            <p:nvPr/>
+          </p:nvSpPr>
+          <p:spPr>
+            <a:xfrm>
+              <a:off x="4476750" y="2905809"/>
+              <a:ext cx="3638550" cy="646331"/>
+            </a:xfrm>
+            <a:prstGeom prst="rect">
+              <a:avLst/>
+            </a:prstGeom>
+            <a:noFill/>
+          </p:spPr>
+          <p:txBody>
+            <a:bodyPr wrap="square" rtlCol="0">
+              <a:spAutoFit/>
+            </a:bodyPr>
+            <a:lstStyle/>
+            <a:p>
+              <a:pPr algn="ctr"/>
+              <a:r>
+                <a:rPr lang="en-US" sz="3600" dirty="0" smtClean="0">
+                  <a:solidFill>
+                    <a:schemeClr val="bg1"/>
+                  </a:solidFill>
+                  <a:latin typeface="Euclid" pitchFamily="18" charset="0"/>
+                </a:rPr>
+                <a:t>Sea – Biển cả</a:t>
+              </a:r>
+              <a:endParaRPr lang="en-US" sz="3600" dirty="0">
+                <a:solidFill>
+                  <a:schemeClr val="bg1"/>
+                </a:solidFill>
+                <a:latin typeface="Euclid" pitchFamily="18" charset="0"/>
+              </a:endParaRPr>
+            </a:p>
+          </p:txBody>
+        </p:sp>
+      </p:grpSp>
+      <p:grpSp>
+        <p:nvGrpSpPr>
+          <p:cNvPr id="7" name="Group 6"/>
+          <p:cNvGrpSpPr/>
+          <p:nvPr/>
+        </p:nvGrpSpPr>
+        <p:grpSpPr>
+          <a:xfrm>
+            <a:off x="4876800" y="3788842"/>
+            <a:ext cx="7315200" cy="3056441"/>
+            <a:chOff x="2476500" y="2552700"/>
+            <a:chExt cx="7639050" cy="1352550"/>
+          </a:xfrm>
+        </p:grpSpPr>
+        <p:sp>
+          <p:nvSpPr>
+            <p:cNvPr id="8" name="Rectangle 7"/>
+            <p:cNvSpPr/>
+            <p:nvPr/>
+          </p:nvSpPr>
+          <p:spPr>
+            <a:xfrm rot="10800000">
+              <a:off x="2476500" y="2552700"/>
+              <a:ext cx="7639050" cy="1352550"/>
+            </a:xfrm>
+            <a:prstGeom prst="rect">
+              <a:avLst/>
+            </a:prstGeom>
+            <a:gradFill flip="none" rotWithShape="1">
+              <a:gsLst>
+                <a:gs pos="7000">
+                  <a:srgbClr val="33E49C">
+                    <a:lumMod val="60000"/>
+                    <a:alpha val="39000"/>
+                  </a:srgbClr>
+                </a:gs>
+                <a:gs pos="100000">
+                  <a:srgbClr val="103945"/>
+                </a:gs>
+              </a:gsLst>
+              <a:lin ang="13500000" scaled="1"/>
+              <a:tileRect/>
+            </a:gradFill>
+            <a:ln w="3175">
+              <a:noFill/>
+            </a:ln>
+          </p:spPr>
+          <p:style>
+            <a:lnRef idx="2">
+              <a:schemeClr val="accent1">
+                <a:shade val="50000"/>
+              </a:schemeClr>
+            </a:lnRef>
+            <a:fillRef idx="1">
+              <a:schemeClr val="accent1"/>
+            </a:fillRef>
+            <a:effectRef idx="0">
+              <a:schemeClr val="accent1"/>
+            </a:effectRef>
+            <a:fontRef idx="minor">
+              <a:schemeClr val="lt1"/>
+            </a:fontRef>
+          </p:style>
+          <p:txBody>
+            <a:bodyPr rtlCol="0" anchor="ctr"/>
+            <a:lstStyle/>
+            <a:p>
+              <a:pPr algn="ctr"/>
+              <a:endParaRPr lang="en-US" dirty="0"/>
+            </a:p>
+          </p:txBody>
+        </p:sp>
+        <p:sp>
+          <p:nvSpPr>
+            <p:cNvPr id="9" name="TextBox 8"/>
+            <p:cNvSpPr txBox="1"/>
+            <p:nvPr/>
+          </p:nvSpPr>
+          <p:spPr>
+            <a:xfrm>
+              <a:off x="4476750" y="2905809"/>
+              <a:ext cx="3638550" cy="379253"/>
+            </a:xfrm>
+            <a:prstGeom prst="rect">
+              <a:avLst/>
+            </a:prstGeom>
+            <a:noFill/>
+          </p:spPr>
+          <p:txBody>
+            <a:bodyPr wrap="square" rtlCol="0">
+              <a:spAutoFit/>
+            </a:bodyPr>
+            <a:lstStyle/>
+            <a:p>
+              <a:pPr algn="ctr"/>
+              <a:endParaRPr lang="en-US" sz="3600" dirty="0">
+                <a:solidFill>
+                  <a:schemeClr val="bg1"/>
+                </a:solidFill>
+                <a:latin typeface="Euclid" pitchFamily="18" charset="0"/>
+              </a:endParaRPr>
+            </a:p>
+          </p:txBody>
+        </p:sp>
+      </p:grpSp>
+      <p:pic>
+        <p:nvPicPr>
+          <p:cNvPr id="10" name="Picture 2" descr="E:\Download\nature-wallpaper-7461792.jpg"/>
+          <p:cNvPicPr>
+            <a:picLocks noChangeAspect="1" noChangeArrowheads="1"/>
+          </p:cNvPicPr>
+          <p:nvPr/>
+        </p:nvPicPr>
+        <p:blipFill rotWithShape="1">
+          <a:blip r:embed="rId2" cstate="print">
+            <a:extLst>
+              <a:ext uri="{28A0092B-C50C-407E-A947-70E740481C1C}">
+                <a14:useLocalDpi xmlns:a14="http://schemas.microsoft.com/office/drawing/2010/main" val="0"/>
+              </a:ext>
+            </a:extLst>
+          </a:blip>
+          <a:srcRect t="10028" r="20661" b="10413"/>
+          <a:stretch/>
+        </p:blipFill>
+        <p:spPr bwMode="auto">
+          <a:xfrm>
+            <a:off x="0" y="3788842"/>
+            <a:ext cx="4876800" cy="3056441"/>
+          </a:xfrm>
+          <a:prstGeom prst="rect">
+            <a:avLst/>
+          </a:prstGeom>
+          <a:noFill/>
+          <a:extLst>
+            <a:ext uri="{909E8E84-426E-40DD-AFC4-6F175D3DCCD1}">
+              <a14:hiddenFill xmlns:a14="http://schemas.microsoft.com/office/drawing/2010/main">
+                <a:solidFill>
+                  <a:srgbClr val="FFFFFF"/>
+                </a:solidFill>
+              </a14:hiddenFill>
+            </a:ext>
+          </a:extLst>
+        </p:spPr>
+      </p:pic>
+    </p:spTree>
+    <p:extLst>
+      <p:ext uri="{BB962C8B-B14F-4D97-AF65-F5344CB8AC3E}">
+        <p14:creationId xmlns:p14="http://schemas.microsoft.com/office/powerpoint/2010/main" val="3650237400"/>
+      </p:ext>
+    </p:extLst>
+  </p:cSld>
+  <p:clrMapOvr>
+    <a:masterClrMapping/>
+  </p:clrMapOvr>
+</p:sld>
+</file>
+
+<file path=ppt/slides/slide15.xml><?xml version="1.0" encoding="utf-8"?>
+<p:sld xmlns:a="http://schemas.openxmlformats.org/drawingml/2006/main" xmlns:r="http://schemas.openxmlformats.org/officeDocument/2006/relationships" xmlns:p="http://schemas.openxmlformats.org/presentationml/2006/main">
+  <p:cSld>
+    <p:spTree>
+      <p:nvGrpSpPr>
+        <p:cNvPr id="1" name=""/>
+        <p:cNvGrpSpPr/>
+        <p:nvPr/>
+      </p:nvGrpSpPr>
+      <p:grpSpPr>
+        <a:xfrm>
+          <a:off x="0" y="0"/>
+          <a:ext cx="0" cy="0"/>
+          <a:chOff x="0" y="0"/>
+          <a:chExt cx="0" cy="0"/>
+        </a:xfrm>
+      </p:grpSpPr>
+      <p:sp>
+        <p:nvSpPr>
+          <p:cNvPr id="2" name="Title 1"/>
+          <p:cNvSpPr>
+            <a:spLocks noGrp="1"/>
+          </p:cNvSpPr>
+          <p:nvPr>
+            <p:ph type="title"/>
+          </p:nvPr>
+        </p:nvSpPr>
+        <p:spPr/>
+        <p:txBody>
+          <a:bodyPr/>
+          <a:lstStyle/>
+          <a:p>
+            <a:endParaRPr lang="en-US"/>
+          </a:p>
+        </p:txBody>
+      </p:sp>
+      <p:sp>
+        <p:nvSpPr>
+          <p:cNvPr id="3" name="Content Placeholder 2"/>
+          <p:cNvSpPr>
+            <a:spLocks noGrp="1"/>
+          </p:cNvSpPr>
+          <p:nvPr>
+            <p:ph idx="1"/>
+          </p:nvPr>
+        </p:nvSpPr>
+        <p:spPr/>
+        <p:txBody>
+          <a:bodyPr/>
+          <a:lstStyle/>
+          <a:p>
+            <a:endParaRPr lang="en-US"/>
+          </a:p>
+        </p:txBody>
+      </p:sp>
+    </p:spTree>
+    <p:extLst>
+      <p:ext uri="{BB962C8B-B14F-4D97-AF65-F5344CB8AC3E}">
+        <p14:creationId xmlns:p14="http://schemas.microsoft.com/office/powerpoint/2010/main" val="2384391590"/>
+      </p:ext>
+    </p:extLst>
+  </p:cSld>
+  <p:clrMapOvr>
+    <a:masterClrMapping/>
+  </p:clrMapOvr>
 </p:sld>
 </file>
 
@@ -4886,11 +5641,7 @@
           <a:p>
             <a:r>
               <a:rPr lang="en-US" dirty="0" smtClean="0"/>
-              <a:t>Kéo thả </a:t>
-            </a:r>
-            <a:r>
-              <a:rPr lang="en-US" dirty="0" smtClean="0"/>
-              <a:t>shape</a:t>
+              <a:t>Kéo thả shape</a:t>
             </a:r>
           </a:p>
           <a:p>
@@ -5523,7 +6274,7 @@
   <a:extraClrSchemeLst/>
   <a:extLst>
     <a:ext uri="{05A4C25C-085E-4340-85A3-A5531E510DB2}">
-      <thm15:themeFamily xmlns:thm15="http://schemas.microsoft.com/office/thememl/2012/main" xmlns="" name="Office Theme" id="{62F939B6-93AF-4DB8-9C6B-D6C7DFDC589F}" vid="{4A3C46E8-61CC-4603-A589-7422A47A8E4A}"/>
+      <thm15:themeFamily xmlns="" xmlns:thm15="http://schemas.microsoft.com/office/thememl/2012/main" name="Office Theme" id="{62F939B6-93AF-4DB8-9C6B-D6C7DFDC589F}" vid="{4A3C46E8-61CC-4603-A589-7422A47A8E4A}"/>
     </a:ext>
   </a:extLst>
 </a:theme>
@@ -6069,7 +6820,7 @@
   <a:extraClrSchemeLst/>
   <a:extLst>
     <a:ext uri="{05A4C25C-085E-4340-85A3-A5531E510DB2}">
-      <thm15:themeFamily xmlns:thm15="http://schemas.microsoft.com/office/thememl/2012/main" xmlns="" name="Office Theme" id="{62F939B6-93AF-4DB8-9C6B-D6C7DFDC589F}" vid="{4A3C46E8-61CC-4603-A589-7422A47A8E4A}"/>
+      <thm15:themeFamily xmlns="" xmlns:thm15="http://schemas.microsoft.com/office/thememl/2012/main" name="Office Theme" id="{62F939B6-93AF-4DB8-9C6B-D6C7DFDC589F}" vid="{4A3C46E8-61CC-4603-A589-7422A47A8E4A}"/>
     </a:ext>
   </a:extLst>
 </a:theme>

</xml_diff>

<commit_message>
Commit ngày 28/9/2022 lần 1
</commit_message>
<xml_diff>
--- a/Powerpoint cơ bản.pptx
+++ b/Powerpoint cơ bản.pptx
@@ -5,10 +5,10 @@
     <p:sldMasterId id="2147483648" r:id="rId1"/>
   </p:sldMasterIdLst>
   <p:notesMasterIdLst>
-    <p:notesMasterId r:id="rId17"/>
+    <p:notesMasterId r:id="rId21"/>
   </p:notesMasterIdLst>
   <p:handoutMasterIdLst>
-    <p:handoutMasterId r:id="rId18"/>
+    <p:handoutMasterId r:id="rId22"/>
   </p:handoutMasterIdLst>
   <p:sldIdLst>
     <p:sldId id="256" r:id="rId2"/>
@@ -22,10 +22,14 @@
     <p:sldId id="264" r:id="rId10"/>
     <p:sldId id="265" r:id="rId11"/>
     <p:sldId id="266" r:id="rId12"/>
-    <p:sldId id="267" r:id="rId13"/>
-    <p:sldId id="268" r:id="rId14"/>
-    <p:sldId id="269" r:id="rId15"/>
-    <p:sldId id="270" r:id="rId16"/>
+    <p:sldId id="271" r:id="rId13"/>
+    <p:sldId id="272" r:id="rId14"/>
+    <p:sldId id="270" r:id="rId15"/>
+    <p:sldId id="273" r:id="rId16"/>
+    <p:sldId id="274" r:id="rId17"/>
+    <p:sldId id="267" r:id="rId18"/>
+    <p:sldId id="268" r:id="rId19"/>
+    <p:sldId id="269" r:id="rId20"/>
   </p:sldIdLst>
   <p:sldSz cx="12192000" cy="6858000"/>
   <p:notesSz cx="6858000" cy="9144000"/>
@@ -140,6 +144,11 @@
             <p14:sldId id="264"/>
             <p14:sldId id="265"/>
             <p14:sldId id="266"/>
+            <p14:sldId id="271"/>
+            <p14:sldId id="272"/>
+            <p14:sldId id="270"/>
+            <p14:sldId id="273"/>
+            <p14:sldId id="274"/>
           </p14:sldIdLst>
         </p14:section>
         <p14:section name="Slide hoàn chỉnh đầu tiên" id="{E43179C1-FB52-43C3-8240-F10928E3A921}">
@@ -147,13 +156,26 @@
             <p14:sldId id="267"/>
             <p14:sldId id="268"/>
             <p14:sldId id="269"/>
-            <p14:sldId id="270"/>
           </p14:sldIdLst>
         </p14:section>
       </p14:sectionLst>
     </p:ext>
     <p:ext uri="{EFAFB233-063F-42B5-8137-9DF3F51BA10A}">
-      <p15:sldGuideLst xmlns="" xmlns:p15="http://schemas.microsoft.com/office/powerpoint/2012/main"/>
+      <p15:sldGuideLst xmlns:p15="http://schemas.microsoft.com/office/powerpoint/2012/main">
+        <p15:guide id="1" orient="horz" pos="2160">
+          <p15:clr>
+            <a:srgbClr val="A4A3A4"/>
+          </p15:clr>
+        </p15:guide>
+        <p15:guide id="2" pos="3840">
+          <p15:clr>
+            <a:srgbClr val="A4A3A4"/>
+          </p15:clr>
+        </p15:guide>
+      </p15:sldGuideLst>
+    </p:ext>
+    <p:ext uri="{2D200454-40CA-4A62-9FC3-DE9A4176ACB9}">
+      <p15:notesGuideLst xmlns:p15="http://schemas.microsoft.com/office/powerpoint/2012/main"/>
     </p:ext>
   </p:extLst>
 </p:presentation>
@@ -241,7 +263,7 @@
           <a:p>
             <a:fld id="{C7518CE1-D1CB-4FA9-B0A3-604DBFBB325F}" type="datetimeFigureOut">
               <a:rPr lang="en-US" smtClean="0"/>
-              <a:t>9/25/2022</a:t>
+              <a:t>9/26/2022</a:t>
             </a:fld>
             <a:endParaRPr lang="en-US"/>
           </a:p>
@@ -406,7 +428,7 @@
           <a:p>
             <a:fld id="{FF127186-9FC2-4AFB-8263-FD27C3BC53F0}" type="datetimeFigureOut">
               <a:rPr lang="en-US" smtClean="0"/>
-              <a:t>9/25/2022</a:t>
+              <a:t>9/26/2022</a:t>
             </a:fld>
             <a:endParaRPr lang="en-US"/>
           </a:p>
@@ -757,9 +779,107 @@
               <a:buChar char="-"/>
             </a:pPr>
             <a:r>
-              <a:rPr lang="en-US" baseline="0" smtClean="0"/>
-              <a:t>Chỉnh transparency</a:t>
-            </a:r>
+              <a:rPr lang="en-US" baseline="0" dirty="0" smtClean="0"/>
+              <a:t>Chỉnh </a:t>
+            </a:r>
+            <a:r>
+              <a:rPr lang="en-US" baseline="0" dirty="0" smtClean="0"/>
+              <a:t>transparency</a:t>
+            </a:r>
+          </a:p>
+          <a:p>
+            <a:pPr marL="171450" indent="-171450">
+              <a:buFontTx/>
+              <a:buChar char="-"/>
+            </a:pPr>
+            <a:r>
+              <a:rPr lang="en-US" dirty="0" smtClean="0"/>
+              <a:t>Thêm</a:t>
+            </a:r>
+            <a:r>
+              <a:rPr lang="en-US" baseline="0" dirty="0" smtClean="0"/>
+              <a:t> gradient</a:t>
+            </a:r>
+          </a:p>
+          <a:p>
+            <a:pPr marL="171450" indent="-171450">
+              <a:buFontTx/>
+              <a:buChar char="-"/>
+            </a:pPr>
+            <a:r>
+              <a:rPr lang="en-US" baseline="0" dirty="0" smtClean="0"/>
+              <a:t>Làm title – Xoay ngược 180 độ graph đã copy ở nền</a:t>
+            </a:r>
+          </a:p>
+          <a:p>
+            <a:pPr marL="171450" indent="-171450">
+              <a:buFontTx/>
+              <a:buChar char="-"/>
+            </a:pPr>
+            <a:r>
+              <a:rPr lang="en-US" baseline="0" dirty="0" smtClean="0"/>
+              <a:t>Group khối textbox</a:t>
+            </a:r>
+          </a:p>
+          <a:p>
+            <a:pPr marL="171450" indent="-171450">
+              <a:buFontTx/>
+              <a:buChar char="-"/>
+            </a:pPr>
+            <a:r>
+              <a:rPr lang="en-US" baseline="0" dirty="0" smtClean="0"/>
+              <a:t>Center khối</a:t>
+            </a:r>
+          </a:p>
+          <a:p>
+            <a:pPr marL="0" indent="0">
+              <a:buFontTx/>
+              <a:buNone/>
+            </a:pPr>
+            <a:r>
+              <a:rPr lang="en-US" baseline="0" dirty="0" smtClean="0"/>
+              <a:t>Animation:</a:t>
+            </a:r>
+          </a:p>
+          <a:p>
+            <a:pPr marL="171450" indent="-171450">
+              <a:buFontTx/>
+              <a:buChar char="-"/>
+            </a:pPr>
+            <a:r>
+              <a:rPr lang="en-US" baseline="0" dirty="0" smtClean="0"/>
+              <a:t>Chọn split và options Horizon</a:t>
+            </a:r>
+          </a:p>
+          <a:p>
+            <a:pPr marL="171450" indent="-171450">
+              <a:buFontTx/>
+              <a:buChar char="-"/>
+            </a:pPr>
+            <a:r>
+              <a:rPr lang="en-US" baseline="0" dirty="0" smtClean="0"/>
+              <a:t>By letter animation</a:t>
+            </a:r>
+          </a:p>
+          <a:p>
+            <a:pPr marL="171450" indent="-171450">
+              <a:buFontTx/>
+              <a:buChar char="-"/>
+            </a:pPr>
+            <a:endParaRPr lang="en-US" baseline="0" dirty="0" smtClean="0"/>
+          </a:p>
+          <a:p>
+            <a:pPr marL="171450" indent="-171450">
+              <a:buFontTx/>
+              <a:buChar char="-"/>
+            </a:pPr>
+            <a:endParaRPr lang="en-US" baseline="0" dirty="0" smtClean="0"/>
+          </a:p>
+          <a:p>
+            <a:pPr marL="171450" indent="-171450">
+              <a:buFontTx/>
+              <a:buChar char="-"/>
+            </a:pPr>
             <a:endParaRPr lang="en-US" dirty="0"/>
           </a:p>
         </p:txBody>
@@ -781,7 +901,7 @@
           <a:p>
             <a:fld id="{6AC8286A-B193-4BDC-A266-E4FB70D043FF}" type="slidenum">
               <a:rPr lang="en-US" smtClean="0"/>
-              <a:t>12</a:t>
+              <a:t>17</a:t>
             </a:fld>
             <a:endParaRPr lang="en-US"/>
           </a:p>
@@ -931,7 +1051,7 @@
           <a:p>
             <a:fld id="{CF4B45C1-41D8-4316-9FDD-2ADADC423E48}" type="datetimeFigureOut">
               <a:rPr lang="en-US" smtClean="0"/>
-              <a:t>9/25/2022</a:t>
+              <a:t>9/26/2022</a:t>
             </a:fld>
             <a:endParaRPr lang="en-US"/>
           </a:p>
@@ -1101,7 +1221,7 @@
           <a:p>
             <a:fld id="{CF4B45C1-41D8-4316-9FDD-2ADADC423E48}" type="datetimeFigureOut">
               <a:rPr lang="en-US" smtClean="0"/>
-              <a:t>9/25/2022</a:t>
+              <a:t>9/26/2022</a:t>
             </a:fld>
             <a:endParaRPr lang="en-US"/>
           </a:p>
@@ -1281,7 +1401,7 @@
           <a:p>
             <a:fld id="{CF4B45C1-41D8-4316-9FDD-2ADADC423E48}" type="datetimeFigureOut">
               <a:rPr lang="en-US" smtClean="0"/>
-              <a:t>9/25/2022</a:t>
+              <a:t>9/26/2022</a:t>
             </a:fld>
             <a:endParaRPr lang="en-US"/>
           </a:p>
@@ -1451,7 +1571,7 @@
           <a:p>
             <a:fld id="{CF4B45C1-41D8-4316-9FDD-2ADADC423E48}" type="datetimeFigureOut">
               <a:rPr lang="en-US" smtClean="0"/>
-              <a:t>9/25/2022</a:t>
+              <a:t>9/26/2022</a:t>
             </a:fld>
             <a:endParaRPr lang="en-US"/>
           </a:p>
@@ -1697,7 +1817,7 @@
           <a:p>
             <a:fld id="{CF4B45C1-41D8-4316-9FDD-2ADADC423E48}" type="datetimeFigureOut">
               <a:rPr lang="en-US" smtClean="0"/>
-              <a:t>9/25/2022</a:t>
+              <a:t>9/26/2022</a:t>
             </a:fld>
             <a:endParaRPr lang="en-US"/>
           </a:p>
@@ -1929,7 +2049,7 @@
           <a:p>
             <a:fld id="{CF4B45C1-41D8-4316-9FDD-2ADADC423E48}" type="datetimeFigureOut">
               <a:rPr lang="en-US" smtClean="0"/>
-              <a:t>9/25/2022</a:t>
+              <a:t>9/26/2022</a:t>
             </a:fld>
             <a:endParaRPr lang="en-US"/>
           </a:p>
@@ -2296,7 +2416,7 @@
           <a:p>
             <a:fld id="{CF4B45C1-41D8-4316-9FDD-2ADADC423E48}" type="datetimeFigureOut">
               <a:rPr lang="en-US" smtClean="0"/>
-              <a:t>9/25/2022</a:t>
+              <a:t>9/26/2022</a:t>
             </a:fld>
             <a:endParaRPr lang="en-US"/>
           </a:p>
@@ -2414,7 +2534,7 @@
           <a:p>
             <a:fld id="{CF4B45C1-41D8-4316-9FDD-2ADADC423E48}" type="datetimeFigureOut">
               <a:rPr lang="en-US" smtClean="0"/>
-              <a:t>9/25/2022</a:t>
+              <a:t>9/26/2022</a:t>
             </a:fld>
             <a:endParaRPr lang="en-US"/>
           </a:p>
@@ -2509,7 +2629,7 @@
           <a:p>
             <a:fld id="{CF4B45C1-41D8-4316-9FDD-2ADADC423E48}" type="datetimeFigureOut">
               <a:rPr lang="en-US" smtClean="0"/>
-              <a:t>9/25/2022</a:t>
+              <a:t>9/26/2022</a:t>
             </a:fld>
             <a:endParaRPr lang="en-US"/>
           </a:p>
@@ -2786,7 +2906,7 @@
           <a:p>
             <a:fld id="{CF4B45C1-41D8-4316-9FDD-2ADADC423E48}" type="datetimeFigureOut">
               <a:rPr lang="en-US" smtClean="0"/>
-              <a:t>9/25/2022</a:t>
+              <a:t>9/26/2022</a:t>
             </a:fld>
             <a:endParaRPr lang="en-US"/>
           </a:p>
@@ -3039,7 +3159,7 @@
           <a:p>
             <a:fld id="{CF4B45C1-41D8-4316-9FDD-2ADADC423E48}" type="datetimeFigureOut">
               <a:rPr lang="en-US" smtClean="0"/>
-              <a:t>9/25/2022</a:t>
+              <a:t>9/26/2022</a:t>
             </a:fld>
             <a:endParaRPr lang="en-US"/>
           </a:p>
@@ -3252,7 +3372,7 @@
           <a:p>
             <a:fld id="{CF4B45C1-41D8-4316-9FDD-2ADADC423E48}" type="datetimeFigureOut">
               <a:rPr lang="en-US" smtClean="0"/>
-              <a:t>9/25/2022</a:t>
+              <a:t>9/26/2022</a:t>
             </a:fld>
             <a:endParaRPr lang="en-US"/>
           </a:p>
@@ -4030,6 +4150,1062 @@
           <a:chExt cx="0" cy="0"/>
         </a:xfrm>
       </p:grpSpPr>
+      <p:sp>
+        <p:nvSpPr>
+          <p:cNvPr id="2" name="Title 1"/>
+          <p:cNvSpPr>
+            <a:spLocks noGrp="1"/>
+          </p:cNvSpPr>
+          <p:nvPr>
+            <p:ph type="title"/>
+          </p:nvPr>
+        </p:nvSpPr>
+        <p:spPr/>
+        <p:txBody>
+          <a:bodyPr/>
+          <a:lstStyle/>
+          <a:p>
+            <a:r>
+              <a:rPr lang="en-US" dirty="0" smtClean="0"/>
+              <a:t>XII</a:t>
+            </a:r>
+            <a:r>
+              <a:rPr lang="en-US" dirty="0" smtClean="0"/>
+              <a:t>. Animation</a:t>
+            </a:r>
+            <a:endParaRPr lang="en-US" dirty="0"/>
+          </a:p>
+        </p:txBody>
+      </p:sp>
+      <p:sp>
+        <p:nvSpPr>
+          <p:cNvPr id="3" name="Content Placeholder 2"/>
+          <p:cNvSpPr>
+            <a:spLocks noGrp="1"/>
+          </p:cNvSpPr>
+          <p:nvPr>
+            <p:ph idx="1"/>
+          </p:nvPr>
+        </p:nvSpPr>
+        <p:spPr/>
+        <p:txBody>
+          <a:bodyPr/>
+          <a:lstStyle/>
+          <a:p>
+            <a:r>
+              <a:rPr lang="en-US" dirty="0" smtClean="0"/>
+              <a:t>Animation cho từng phần tử</a:t>
+            </a:r>
+          </a:p>
+          <a:p>
+            <a:r>
+              <a:rPr lang="en-US" dirty="0" smtClean="0"/>
+              <a:t>Animation cho 1 slide (chuyển slide)</a:t>
+            </a:r>
+          </a:p>
+          <a:p>
+            <a:r>
+              <a:rPr lang="en-US" dirty="0" smtClean="0"/>
+              <a:t>Transtions: </a:t>
+            </a:r>
+          </a:p>
+          <a:p>
+            <a:pPr lvl="1"/>
+            <a:r>
+              <a:rPr lang="en-US" dirty="0" smtClean="0"/>
+              <a:t>Slideshow –&gt; Set Up the slideshow -&gt; Browser By an invidial (Chuyển đổi cách chiếu slide)</a:t>
+            </a:r>
+          </a:p>
+          <a:p>
+            <a:pPr lvl="1"/>
+            <a:r>
+              <a:rPr lang="en-US" dirty="0" smtClean="0"/>
+              <a:t>Morph (Dùng từ office 365 trở lên mới có)</a:t>
+            </a:r>
+          </a:p>
+          <a:p>
+            <a:pPr lvl="1"/>
+            <a:r>
+              <a:rPr lang="en-US" dirty="0" smtClean="0"/>
+              <a:t>Chọn chuyển đổi cho từng slide</a:t>
+            </a:r>
+          </a:p>
+          <a:p>
+            <a:pPr lvl="1"/>
+            <a:r>
+              <a:rPr lang="en-US" dirty="0" smtClean="0"/>
+              <a:t>Effect options cho 1 số chuyển đổi</a:t>
+            </a:r>
+          </a:p>
+          <a:p>
+            <a:pPr lvl="1"/>
+            <a:r>
+              <a:rPr lang="en-US" dirty="0" smtClean="0"/>
+              <a:t>Timming cho từng slide</a:t>
+            </a:r>
+          </a:p>
+          <a:p>
+            <a:pPr lvl="1"/>
+            <a:r>
+              <a:rPr lang="en-US" dirty="0" smtClean="0"/>
+              <a:t>Create video and used timeing (Export -&gt; Export the video)</a:t>
+            </a:r>
+          </a:p>
+          <a:p>
+            <a:pPr lvl="1"/>
+            <a:endParaRPr lang="en-US" dirty="0" smtClean="0"/>
+          </a:p>
+          <a:p>
+            <a:pPr lvl="1"/>
+            <a:endParaRPr lang="en-US" dirty="0"/>
+          </a:p>
+        </p:txBody>
+      </p:sp>
+    </p:spTree>
+    <p:extLst>
+      <p:ext uri="{BB962C8B-B14F-4D97-AF65-F5344CB8AC3E}">
+        <p14:creationId xmlns:p14="http://schemas.microsoft.com/office/powerpoint/2010/main" val="504360731"/>
+      </p:ext>
+    </p:extLst>
+  </p:cSld>
+  <p:clrMapOvr>
+    <a:masterClrMapping/>
+  </p:clrMapOvr>
+  <p:timing>
+    <p:tnLst>
+      <p:par>
+        <p:cTn id="1" dur="indefinite" restart="never" nodeType="tmRoot"/>
+      </p:par>
+    </p:tnLst>
+  </p:timing>
+</p:sld>
+</file>
+
+<file path=ppt/slides/slide13.xml><?xml version="1.0" encoding="utf-8"?>
+<p:sld xmlns:a="http://schemas.openxmlformats.org/drawingml/2006/main" xmlns:r="http://schemas.openxmlformats.org/officeDocument/2006/relationships" xmlns:p="http://schemas.openxmlformats.org/presentationml/2006/main">
+  <p:cSld>
+    <p:spTree>
+      <p:nvGrpSpPr>
+        <p:cNvPr id="1" name=""/>
+        <p:cNvGrpSpPr/>
+        <p:nvPr/>
+      </p:nvGrpSpPr>
+      <p:grpSpPr>
+        <a:xfrm>
+          <a:off x="0" y="0"/>
+          <a:ext cx="0" cy="0"/>
+          <a:chOff x="0" y="0"/>
+          <a:chExt cx="0" cy="0"/>
+        </a:xfrm>
+      </p:grpSpPr>
+      <p:sp>
+        <p:nvSpPr>
+          <p:cNvPr id="2" name="Title 1"/>
+          <p:cNvSpPr>
+            <a:spLocks noGrp="1"/>
+          </p:cNvSpPr>
+          <p:nvPr>
+            <p:ph type="title"/>
+          </p:nvPr>
+        </p:nvSpPr>
+        <p:spPr/>
+        <p:txBody>
+          <a:bodyPr/>
+          <a:lstStyle/>
+          <a:p>
+            <a:r>
+              <a:rPr lang="en-US" dirty="0" smtClean="0"/>
+              <a:t>XII</a:t>
+            </a:r>
+            <a:r>
+              <a:rPr lang="en-US" dirty="0" smtClean="0"/>
+              <a:t>. Animation</a:t>
+            </a:r>
+            <a:endParaRPr lang="en-US" dirty="0"/>
+          </a:p>
+        </p:txBody>
+      </p:sp>
+      <p:sp>
+        <p:nvSpPr>
+          <p:cNvPr id="3" name="Content Placeholder 2"/>
+          <p:cNvSpPr>
+            <a:spLocks noGrp="1"/>
+          </p:cNvSpPr>
+          <p:nvPr>
+            <p:ph idx="1"/>
+          </p:nvPr>
+        </p:nvSpPr>
+        <p:spPr/>
+        <p:txBody>
+          <a:bodyPr/>
+          <a:lstStyle/>
+          <a:p>
+            <a:r>
+              <a:rPr lang="en-US" dirty="0" smtClean="0"/>
+              <a:t>Animation: </a:t>
+            </a:r>
+          </a:p>
+          <a:p>
+            <a:pPr lvl="1"/>
+            <a:r>
+              <a:rPr lang="en-US" dirty="0" smtClean="0"/>
+              <a:t>Chọn 1 cái</a:t>
+            </a:r>
+          </a:p>
+          <a:p>
+            <a:pPr lvl="1"/>
+            <a:r>
+              <a:rPr lang="en-US" dirty="0" smtClean="0"/>
+              <a:t>More Entrance Effect</a:t>
+            </a:r>
+          </a:p>
+          <a:p>
+            <a:pPr lvl="1"/>
+            <a:r>
+              <a:rPr lang="en-US" dirty="0" smtClean="0"/>
+              <a:t>Effect Options </a:t>
+            </a:r>
+          </a:p>
+          <a:p>
+            <a:pPr lvl="1"/>
+            <a:endParaRPr lang="en-US" dirty="0" smtClean="0"/>
+          </a:p>
+          <a:p>
+            <a:pPr lvl="1"/>
+            <a:endParaRPr lang="en-US" dirty="0"/>
+          </a:p>
+        </p:txBody>
+      </p:sp>
+    </p:spTree>
+    <p:extLst>
+      <p:ext uri="{BB962C8B-B14F-4D97-AF65-F5344CB8AC3E}">
+        <p14:creationId xmlns:p14="http://schemas.microsoft.com/office/powerpoint/2010/main" val="4248275709"/>
+      </p:ext>
+    </p:extLst>
+  </p:cSld>
+  <p:clrMapOvr>
+    <a:masterClrMapping/>
+  </p:clrMapOvr>
+  <p:timing>
+    <p:tnLst>
+      <p:par>
+        <p:cTn id="1" dur="indefinite" restart="never" nodeType="tmRoot"/>
+      </p:par>
+    </p:tnLst>
+  </p:timing>
+</p:sld>
+</file>
+
+<file path=ppt/slides/slide14.xml><?xml version="1.0" encoding="utf-8"?>
+<p:sld xmlns:a="http://schemas.openxmlformats.org/drawingml/2006/main" xmlns:r="http://schemas.openxmlformats.org/officeDocument/2006/relationships" xmlns:p="http://schemas.openxmlformats.org/presentationml/2006/main">
+  <p:cSld>
+    <p:spTree>
+      <p:nvGrpSpPr>
+        <p:cNvPr id="1" name=""/>
+        <p:cNvGrpSpPr/>
+        <p:nvPr/>
+      </p:nvGrpSpPr>
+      <p:grpSpPr>
+        <a:xfrm>
+          <a:off x="0" y="0"/>
+          <a:ext cx="0" cy="0"/>
+          <a:chOff x="0" y="0"/>
+          <a:chExt cx="0" cy="0"/>
+        </a:xfrm>
+      </p:grpSpPr>
+      <p:pic>
+        <p:nvPicPr>
+          <p:cNvPr id="5" name="Picture 2" descr="E:\Download\nature-wallpaper-7461792.jpg"/>
+          <p:cNvPicPr>
+            <a:picLocks noChangeAspect="1" noChangeArrowheads="1"/>
+          </p:cNvPicPr>
+          <p:nvPr/>
+        </p:nvPicPr>
+        <p:blipFill rotWithShape="1">
+          <a:blip r:embed="rId2" cstate="print">
+            <a:extLst>
+              <a:ext uri="{28A0092B-C50C-407E-A947-70E740481C1C}">
+                <a14:useLocalDpi xmlns:a14="http://schemas.microsoft.com/office/drawing/2010/main" val="0"/>
+              </a:ext>
+            </a:extLst>
+          </a:blip>
+          <a:srcRect t="10028" r="20661" b="10413"/>
+          <a:stretch/>
+        </p:blipFill>
+        <p:spPr bwMode="auto">
+          <a:xfrm>
+            <a:off x="805913" y="425710"/>
+            <a:ext cx="2975673" cy="3056441"/>
+          </a:xfrm>
+          <a:prstGeom prst="ellipse">
+            <a:avLst/>
+          </a:prstGeom>
+          <a:noFill/>
+          <a:extLst>
+            <a:ext uri="{909E8E84-426E-40DD-AFC4-6F175D3DCCD1}">
+              <a14:hiddenFill xmlns:a14="http://schemas.microsoft.com/office/drawing/2010/main">
+                <a:solidFill>
+                  <a:srgbClr val="FFFFFF"/>
+                </a:solidFill>
+              </a14:hiddenFill>
+            </a:ext>
+          </a:extLst>
+        </p:spPr>
+      </p:pic>
+      <p:pic>
+        <p:nvPicPr>
+          <p:cNvPr id="6" name="Picture 2" descr="E:\Download\nature-wallpaper-7461792.jpg"/>
+          <p:cNvPicPr>
+            <a:picLocks noChangeAspect="1" noChangeArrowheads="1"/>
+          </p:cNvPicPr>
+          <p:nvPr/>
+        </p:nvPicPr>
+        <p:blipFill rotWithShape="1">
+          <a:blip r:embed="rId2" cstate="print">
+            <a:extLst>
+              <a:ext uri="{28A0092B-C50C-407E-A947-70E740481C1C}">
+                <a14:useLocalDpi xmlns:a14="http://schemas.microsoft.com/office/drawing/2010/main" val="0"/>
+              </a:ext>
+            </a:extLst>
+          </a:blip>
+          <a:srcRect t="10028" r="20661" b="10413"/>
+          <a:stretch/>
+        </p:blipFill>
+        <p:spPr bwMode="auto">
+          <a:xfrm>
+            <a:off x="4122550" y="425709"/>
+            <a:ext cx="2975673" cy="3056441"/>
+          </a:xfrm>
+          <a:prstGeom prst="ellipse">
+            <a:avLst/>
+          </a:prstGeom>
+          <a:noFill/>
+          <a:extLst>
+            <a:ext uri="{909E8E84-426E-40DD-AFC4-6F175D3DCCD1}">
+              <a14:hiddenFill xmlns:a14="http://schemas.microsoft.com/office/drawing/2010/main">
+                <a:solidFill>
+                  <a:srgbClr val="FFFFFF"/>
+                </a:solidFill>
+              </a14:hiddenFill>
+            </a:ext>
+          </a:extLst>
+        </p:spPr>
+      </p:pic>
+      <p:pic>
+        <p:nvPicPr>
+          <p:cNvPr id="8" name="Picture 2" descr="E:\Download\nature-wallpaper-7461792.jpg"/>
+          <p:cNvPicPr>
+            <a:picLocks noChangeAspect="1" noChangeArrowheads="1"/>
+          </p:cNvPicPr>
+          <p:nvPr/>
+        </p:nvPicPr>
+        <p:blipFill rotWithShape="1">
+          <a:blip r:embed="rId2" cstate="print">
+            <a:extLst>
+              <a:ext uri="{28A0092B-C50C-407E-A947-70E740481C1C}">
+                <a14:useLocalDpi xmlns:a14="http://schemas.microsoft.com/office/drawing/2010/main" val="0"/>
+              </a:ext>
+            </a:extLst>
+          </a:blip>
+          <a:srcRect t="10028" r="20661" b="10413"/>
+          <a:stretch/>
+        </p:blipFill>
+        <p:spPr bwMode="auto">
+          <a:xfrm>
+            <a:off x="7439187" y="425708"/>
+            <a:ext cx="2975673" cy="3056441"/>
+          </a:xfrm>
+          <a:prstGeom prst="ellipse">
+            <a:avLst/>
+          </a:prstGeom>
+          <a:noFill/>
+          <a:extLst>
+            <a:ext uri="{909E8E84-426E-40DD-AFC4-6F175D3DCCD1}">
+              <a14:hiddenFill xmlns:a14="http://schemas.microsoft.com/office/drawing/2010/main">
+                <a:solidFill>
+                  <a:srgbClr val="FFFFFF"/>
+                </a:solidFill>
+              </a14:hiddenFill>
+            </a:ext>
+          </a:extLst>
+        </p:spPr>
+      </p:pic>
+      <p:pic>
+        <p:nvPicPr>
+          <p:cNvPr id="9" name="Picture 2" descr="E:\Download\nature-wallpaper-7461792.jpg"/>
+          <p:cNvPicPr>
+            <a:picLocks noChangeAspect="1" noChangeArrowheads="1"/>
+          </p:cNvPicPr>
+          <p:nvPr/>
+        </p:nvPicPr>
+        <p:blipFill rotWithShape="1">
+          <a:blip r:embed="rId2" cstate="print">
+            <a:extLst>
+              <a:ext uri="{28A0092B-C50C-407E-A947-70E740481C1C}">
+                <a14:useLocalDpi xmlns:a14="http://schemas.microsoft.com/office/drawing/2010/main" val="0"/>
+              </a:ext>
+            </a:extLst>
+          </a:blip>
+          <a:srcRect t="10028" r="20661" b="10413"/>
+          <a:stretch/>
+        </p:blipFill>
+        <p:spPr bwMode="auto">
+          <a:xfrm>
+            <a:off x="663845" y="3600279"/>
+            <a:ext cx="2975673" cy="3056441"/>
+          </a:xfrm>
+          <a:prstGeom prst="ellipse">
+            <a:avLst/>
+          </a:prstGeom>
+          <a:noFill/>
+          <a:extLst>
+            <a:ext uri="{909E8E84-426E-40DD-AFC4-6F175D3DCCD1}">
+              <a14:hiddenFill xmlns:a14="http://schemas.microsoft.com/office/drawing/2010/main">
+                <a:solidFill>
+                  <a:srgbClr val="FFFFFF"/>
+                </a:solidFill>
+              </a14:hiddenFill>
+            </a:ext>
+          </a:extLst>
+        </p:spPr>
+      </p:pic>
+    </p:spTree>
+    <p:extLst>
+      <p:ext uri="{BB962C8B-B14F-4D97-AF65-F5344CB8AC3E}">
+        <p14:creationId xmlns:p14="http://schemas.microsoft.com/office/powerpoint/2010/main" val="2384391590"/>
+      </p:ext>
+    </p:extLst>
+  </p:cSld>
+  <p:clrMapOvr>
+    <a:masterClrMapping/>
+  </p:clrMapOvr>
+  <p:timing>
+    <p:tnLst>
+      <p:par>
+        <p:cTn id="1" dur="indefinite" restart="never" nodeType="tmRoot">
+          <p:childTnLst>
+            <p:seq concurrent="1" nextAc="seek">
+              <p:cTn id="2" dur="indefinite" nodeType="mainSeq">
+                <p:childTnLst>
+                  <p:par>
+                    <p:cTn id="3" fill="hold">
+                      <p:stCondLst>
+                        <p:cond delay="indefinite"/>
+                      </p:stCondLst>
+                      <p:childTnLst>
+                        <p:par>
+                          <p:cTn id="4" fill="hold">
+                            <p:stCondLst>
+                              <p:cond delay="0"/>
+                            </p:stCondLst>
+                            <p:childTnLst>
+                              <p:par>
+                                <p:cTn id="5" presetID="6" presetClass="emph" presetSubtype="0" fill="hold" nodeType="clickEffect">
+                                  <p:stCondLst>
+                                    <p:cond delay="0"/>
+                                  </p:stCondLst>
+                                  <p:childTnLst>
+                                    <p:animScale>
+                                      <p:cBhvr>
+                                        <p:cTn id="6" dur="3750" fill="hold"/>
+                                        <p:tgtEl>
+                                          <p:spTgt spid="6"/>
+                                        </p:tgtEl>
+                                      </p:cBhvr>
+                                      <p:by x="150000" y="150000"/>
+                                    </p:animScale>
+                                  </p:childTnLst>
+                                </p:cTn>
+                              </p:par>
+                            </p:childTnLst>
+                          </p:cTn>
+                        </p:par>
+                      </p:childTnLst>
+                    </p:cTn>
+                  </p:par>
+                  <p:par>
+                    <p:cTn id="7" fill="hold">
+                      <p:stCondLst>
+                        <p:cond delay="indefinite"/>
+                      </p:stCondLst>
+                      <p:childTnLst>
+                        <p:par>
+                          <p:cTn id="8" fill="hold">
+                            <p:stCondLst>
+                              <p:cond delay="0"/>
+                            </p:stCondLst>
+                            <p:childTnLst>
+                              <p:par>
+                                <p:cTn id="9" presetID="45" presetClass="exit" presetSubtype="0" fill="hold" nodeType="clickEffect">
+                                  <p:stCondLst>
+                                    <p:cond delay="0"/>
+                                  </p:stCondLst>
+                                  <p:childTnLst>
+                                    <p:animEffect transition="out" filter="fade">
+                                      <p:cBhvr>
+                                        <p:cTn id="10" dur="2000"/>
+                                        <p:tgtEl>
+                                          <p:spTgt spid="8"/>
+                                        </p:tgtEl>
+                                      </p:cBhvr>
+                                    </p:animEffect>
+                                    <p:anim calcmode="lin" valueType="num">
+                                      <p:cBhvr>
+                                        <p:cTn id="11" dur="2000"/>
+                                        <p:tgtEl>
+                                          <p:spTgt spid="8"/>
+                                        </p:tgtEl>
+                                        <p:attrNameLst>
+                                          <p:attrName>ppt_w</p:attrName>
+                                        </p:attrNameLst>
+                                      </p:cBhvr>
+                                      <p:tavLst>
+                                        <p:tav tm="0">
+                                          <p:val>
+                                            <p:strVal val="ppt_w"/>
+                                          </p:val>
+                                        </p:tav>
+                                        <p:tav tm="5000">
+                                          <p:val>
+                                            <p:strVal val="0.92*ppt_w"/>
+                                          </p:val>
+                                        </p:tav>
+                                        <p:tav tm="10000">
+                                          <p:val>
+                                            <p:strVal val="0.71*ppt_w"/>
+                                          </p:val>
+                                        </p:tav>
+                                        <p:tav tm="15000">
+                                          <p:val>
+                                            <p:strVal val="0.38*ppt_w"/>
+                                          </p:val>
+                                        </p:tav>
+                                        <p:tav tm="20000">
+                                          <p:val>
+                                            <p:fltVal val="0"/>
+                                          </p:val>
+                                        </p:tav>
+                                        <p:tav tm="25000">
+                                          <p:val>
+                                            <p:strVal val="-0.38*ppt_w"/>
+                                          </p:val>
+                                        </p:tav>
+                                        <p:tav tm="30000">
+                                          <p:val>
+                                            <p:strVal val="-0.71*ppt_w"/>
+                                          </p:val>
+                                        </p:tav>
+                                        <p:tav tm="35000">
+                                          <p:val>
+                                            <p:strVal val="-0.92*ppt_w"/>
+                                          </p:val>
+                                        </p:tav>
+                                        <p:tav tm="40000">
+                                          <p:val>
+                                            <p:strVal val="-ppt_w"/>
+                                          </p:val>
+                                        </p:tav>
+                                        <p:tav tm="45000">
+                                          <p:val>
+                                            <p:strVal val="-0.92*ppt_w"/>
+                                          </p:val>
+                                        </p:tav>
+                                        <p:tav tm="50000">
+                                          <p:val>
+                                            <p:strVal val="-0.71*ppt_w"/>
+                                          </p:val>
+                                        </p:tav>
+                                        <p:tav tm="55000">
+                                          <p:val>
+                                            <p:strVal val="-0.38*ppt_w"/>
+                                          </p:val>
+                                        </p:tav>
+                                        <p:tav tm="60000">
+                                          <p:val>
+                                            <p:fltVal val="0"/>
+                                          </p:val>
+                                        </p:tav>
+                                        <p:tav tm="65000">
+                                          <p:val>
+                                            <p:strVal val="0.38*ppt_w"/>
+                                          </p:val>
+                                        </p:tav>
+                                        <p:tav tm="70000">
+                                          <p:val>
+                                            <p:strVal val="0.71*ppt_w"/>
+                                          </p:val>
+                                        </p:tav>
+                                        <p:tav tm="75000">
+                                          <p:val>
+                                            <p:strVal val="0.92*ppt_w"/>
+                                          </p:val>
+                                        </p:tav>
+                                        <p:tav tm="80000">
+                                          <p:val>
+                                            <p:strVal val="ppt_w"/>
+                                          </p:val>
+                                        </p:tav>
+                                        <p:tav tm="85000">
+                                          <p:val>
+                                            <p:strVal val="0.92*ppt_w"/>
+                                          </p:val>
+                                        </p:tav>
+                                        <p:tav tm="90000">
+                                          <p:val>
+                                            <p:strVal val="0.71*ppt_w"/>
+                                          </p:val>
+                                        </p:tav>
+                                        <p:tav tm="95000">
+                                          <p:val>
+                                            <p:strVal val="0.38*ppt_w"/>
+                                          </p:val>
+                                        </p:tav>
+                                        <p:tav tm="100000">
+                                          <p:val>
+                                            <p:fltVal val="0"/>
+                                          </p:val>
+                                        </p:tav>
+                                      </p:tavLst>
+                                    </p:anim>
+                                    <p:anim calcmode="lin" valueType="num">
+                                      <p:cBhvr>
+                                        <p:cTn id="12" dur="2000"/>
+                                        <p:tgtEl>
+                                          <p:spTgt spid="8"/>
+                                        </p:tgtEl>
+                                        <p:attrNameLst>
+                                          <p:attrName>ppt_h</p:attrName>
+                                        </p:attrNameLst>
+                                      </p:cBhvr>
+                                      <p:tavLst>
+                                        <p:tav tm="0">
+                                          <p:val>
+                                            <p:strVal val="ppt_h"/>
+                                          </p:val>
+                                        </p:tav>
+                                        <p:tav tm="100000">
+                                          <p:val>
+                                            <p:strVal val="ppt_h"/>
+                                          </p:val>
+                                        </p:tav>
+                                      </p:tavLst>
+                                    </p:anim>
+                                    <p:set>
+                                      <p:cBhvr>
+                                        <p:cTn id="13" dur="1" fill="hold">
+                                          <p:stCondLst>
+                                            <p:cond delay="1999"/>
+                                          </p:stCondLst>
+                                        </p:cTn>
+                                        <p:tgtEl>
+                                          <p:spTgt spid="8"/>
+                                        </p:tgtEl>
+                                        <p:attrNameLst>
+                                          <p:attrName>style.visibility</p:attrName>
+                                        </p:attrNameLst>
+                                      </p:cBhvr>
+                                      <p:to>
+                                        <p:strVal val="hidden"/>
+                                      </p:to>
+                                    </p:set>
+                                  </p:childTnLst>
+                                </p:cTn>
+                              </p:par>
+                            </p:childTnLst>
+                          </p:cTn>
+                        </p:par>
+                      </p:childTnLst>
+                    </p:cTn>
+                  </p:par>
+                  <p:par>
+                    <p:cTn id="14" fill="hold">
+                      <p:stCondLst>
+                        <p:cond delay="indefinite"/>
+                      </p:stCondLst>
+                      <p:childTnLst>
+                        <p:par>
+                          <p:cTn id="15" fill="hold">
+                            <p:stCondLst>
+                              <p:cond delay="0"/>
+                            </p:stCondLst>
+                            <p:childTnLst>
+                              <p:par>
+                                <p:cTn id="16" presetID="0" presetClass="path" presetSubtype="0" accel="50000" decel="50000" fill="hold" nodeType="clickEffect">
+                                  <p:stCondLst>
+                                    <p:cond delay="0"/>
+                                  </p:stCondLst>
+                                  <p:childTnLst>
+                                    <p:animMotion origin="layout" path="M 0.19987 0.03865 L 0.19987 0.03888 C 0.20378 0.02754 0.20677 0.01689 0.21172 0.00925 C 0.21862 -0.00116 0.22865 -0.01413 0.23659 -0.02223 C 0.23906 -0.02477 0.24141 -0.02663 0.24375 -0.02917 C 0.24727 -0.03264 0.25065 -0.03727 0.25417 -0.04051 C 0.25964 -0.04538 0.26367 -0.04561 0.2694 -0.04723 C 0.29154 -0.04352 0.2918 -0.05764 0.303 -0.03125 C 0.30456 -0.02801 0.3056 -0.02385 0.30703 -0.02014 C 0.31459 0.0243 0.32396 0.06666 0.32943 0.11319 C 0.33021 0.12013 0.33021 0.128 0.33177 0.13356 C 0.33763 0.15462 0.3444 0.17361 0.35104 0.19236 C 0.35326 0.19837 0.35547 0.20439 0.35821 0.2081 C 0.36042 0.21134 0.36302 0.21203 0.3655 0.21273 C 0.37591 0.21527 0.38633 0.21574 0.39675 0.21736 C 0.40821 0.21041 0.42045 0.21087 0.43112 0.19699 C 0.46068 0.15833 0.48828 0.10925 0.51602 0.06134 C 0.52435 0.04675 0.53281 0.03055 0.5392 0.00925 L 0.55287 -0.03588 C 0.55391 -0.01135 0.55339 -0.00903 0.55925 0.01828 C 0.56081 0.02615 0.56328 0.03217 0.56563 0.03865 C 0.56758 0.04444 0.56966 0.05023 0.57201 0.05462 C 0.57448 0.05879 0.57722 0.0618 0.58008 0.06365 C 0.59193 0.07083 0.60404 0.07569 0.61602 0.08171 C 0.62904 0.07638 0.64206 0.06736 0.65521 0.06574 C 0.65677 0.06574 0.65742 0.07268 0.65768 0.07708 C 0.65847 0.0912 0.65795 0.10578 0.65847 0.12013 C 0.65873 0.12685 0.65925 0.13379 0.66003 0.1405 C 0.66107 0.14837 0.66732 0.16921 0.6681 0.17199 C 0.67878 0.15393 0.68972 0.13703 0.70013 0.11782 C 0.70274 0.11273 0.70534 0.10717 0.70729 0.09976 C 0.71224 0.08032 0.71211 0.08032 0.71211 0.06805 L 0.68321 -0.17153 L 0.66641 -0.40417 " pathEditMode="relative" rAng="0" ptsTypes="AAAAAAAAAAAAAAAAAAAAAAAAAAAAAAAAAA">
+                                      <p:cBhvr>
+                                        <p:cTn id="17" dur="2000" fill="hold"/>
+                                        <p:tgtEl>
+                                          <p:spTgt spid="9"/>
+                                        </p:tgtEl>
+                                        <p:attrNameLst>
+                                          <p:attrName>ppt_x</p:attrName>
+                                          <p:attrName>ppt_y</p:attrName>
+                                        </p:attrNameLst>
+                                      </p:cBhvr>
+                                      <p:rCtr x="25612" y="-13218"/>
+                                    </p:animMotion>
+                                  </p:childTnLst>
+                                </p:cTn>
+                              </p:par>
+                            </p:childTnLst>
+                          </p:cTn>
+                        </p:par>
+                      </p:childTnLst>
+                    </p:cTn>
+                  </p:par>
+                  <p:par>
+                    <p:cTn id="18" fill="hold">
+                      <p:stCondLst>
+                        <p:cond delay="indefinite"/>
+                      </p:stCondLst>
+                      <p:childTnLst>
+                        <p:par>
+                          <p:cTn id="19" fill="hold">
+                            <p:stCondLst>
+                              <p:cond delay="0"/>
+                            </p:stCondLst>
+                            <p:childTnLst>
+                              <p:par>
+                                <p:cTn id="20" presetID="2" presetClass="entr" presetSubtype="8" decel="100000" fill="hold" nodeType="clickEffect">
+                                  <p:stCondLst>
+                                    <p:cond delay="0"/>
+                                  </p:stCondLst>
+                                  <p:childTnLst>
+                                    <p:set>
+                                      <p:cBhvr>
+                                        <p:cTn id="21" dur="1" fill="hold">
+                                          <p:stCondLst>
+                                            <p:cond delay="0"/>
+                                          </p:stCondLst>
+                                        </p:cTn>
+                                        <p:tgtEl>
+                                          <p:spTgt spid="5"/>
+                                        </p:tgtEl>
+                                        <p:attrNameLst>
+                                          <p:attrName>style.visibility</p:attrName>
+                                        </p:attrNameLst>
+                                      </p:cBhvr>
+                                      <p:to>
+                                        <p:strVal val="visible"/>
+                                      </p:to>
+                                    </p:set>
+                                    <p:anim calcmode="lin" valueType="num">
+                                      <p:cBhvr additive="base">
+                                        <p:cTn id="22" dur="500" fill="hold"/>
+                                        <p:tgtEl>
+                                          <p:spTgt spid="5"/>
+                                        </p:tgtEl>
+                                        <p:attrNameLst>
+                                          <p:attrName>ppt_x</p:attrName>
+                                        </p:attrNameLst>
+                                      </p:cBhvr>
+                                      <p:tavLst>
+                                        <p:tav tm="0">
+                                          <p:val>
+                                            <p:strVal val="0-#ppt_w/2"/>
+                                          </p:val>
+                                        </p:tav>
+                                        <p:tav tm="100000">
+                                          <p:val>
+                                            <p:strVal val="#ppt_x"/>
+                                          </p:val>
+                                        </p:tav>
+                                      </p:tavLst>
+                                    </p:anim>
+                                    <p:anim calcmode="lin" valueType="num">
+                                      <p:cBhvr additive="base">
+                                        <p:cTn id="23" dur="500" fill="hold"/>
+                                        <p:tgtEl>
+                                          <p:spTgt spid="5"/>
+                                        </p:tgtEl>
+                                        <p:attrNameLst>
+                                          <p:attrName>ppt_y</p:attrName>
+                                        </p:attrNameLst>
+                                      </p:cBhvr>
+                                      <p:tavLst>
+                                        <p:tav tm="0">
+                                          <p:val>
+                                            <p:strVal val="#ppt_y"/>
+                                          </p:val>
+                                        </p:tav>
+                                        <p:tav tm="100000">
+                                          <p:val>
+                                            <p:strVal val="#ppt_y"/>
+                                          </p:val>
+                                        </p:tav>
+                                      </p:tavLst>
+                                    </p:anim>
+                                  </p:childTnLst>
+                                </p:cTn>
+                              </p:par>
+                            </p:childTnLst>
+                          </p:cTn>
+                        </p:par>
+                      </p:childTnLst>
+                    </p:cTn>
+                  </p:par>
+                </p:childTnLst>
+              </p:cTn>
+              <p:prevCondLst>
+                <p:cond evt="onPrev" delay="0">
+                  <p:tgtEl>
+                    <p:sldTgt/>
+                  </p:tgtEl>
+                </p:cond>
+              </p:prevCondLst>
+              <p:nextCondLst>
+                <p:cond evt="onNext" delay="0">
+                  <p:tgtEl>
+                    <p:sldTgt/>
+                  </p:tgtEl>
+                </p:cond>
+              </p:nextCondLst>
+            </p:seq>
+          </p:childTnLst>
+        </p:cTn>
+      </p:par>
+    </p:tnLst>
+  </p:timing>
+</p:sld>
+</file>
+
+<file path=ppt/slides/slide15.xml><?xml version="1.0" encoding="utf-8"?>
+<p:sld xmlns:a="http://schemas.openxmlformats.org/drawingml/2006/main" xmlns:r="http://schemas.openxmlformats.org/officeDocument/2006/relationships" xmlns:p="http://schemas.openxmlformats.org/presentationml/2006/main">
+  <p:cSld>
+    <p:spTree>
+      <p:nvGrpSpPr>
+        <p:cNvPr id="1" name=""/>
+        <p:cNvGrpSpPr/>
+        <p:nvPr/>
+      </p:nvGrpSpPr>
+      <p:grpSpPr>
+        <a:xfrm>
+          <a:off x="0" y="0"/>
+          <a:ext cx="0" cy="0"/>
+          <a:chOff x="0" y="0"/>
+          <a:chExt cx="0" cy="0"/>
+        </a:xfrm>
+      </p:grpSpPr>
+      <p:sp>
+        <p:nvSpPr>
+          <p:cNvPr id="2" name="Title 1"/>
+          <p:cNvSpPr>
+            <a:spLocks noGrp="1"/>
+          </p:cNvSpPr>
+          <p:nvPr>
+            <p:ph type="title"/>
+          </p:nvPr>
+        </p:nvSpPr>
+        <p:spPr/>
+        <p:txBody>
+          <a:bodyPr/>
+          <a:lstStyle/>
+          <a:p>
+            <a:r>
+              <a:rPr lang="en-US" dirty="0" smtClean="0"/>
+              <a:t>XIII. Animation Plane &amp; start options</a:t>
+            </a:r>
+            <a:endParaRPr lang="en-US" dirty="0"/>
+          </a:p>
+        </p:txBody>
+      </p:sp>
+      <p:sp>
+        <p:nvSpPr>
+          <p:cNvPr id="3" name="Content Placeholder 2"/>
+          <p:cNvSpPr>
+            <a:spLocks noGrp="1"/>
+          </p:cNvSpPr>
+          <p:nvPr>
+            <p:ph idx="1"/>
+          </p:nvPr>
+        </p:nvSpPr>
+        <p:spPr/>
+        <p:txBody>
+          <a:bodyPr/>
+          <a:lstStyle/>
+          <a:p>
+            <a:r>
+              <a:rPr lang="en-US" dirty="0" smtClean="0"/>
+              <a:t>Nếu chúng ta có slection plane, thì ta cũng có animation plane</a:t>
+            </a:r>
+          </a:p>
+          <a:p>
+            <a:r>
+              <a:rPr lang="en-US" dirty="0" smtClean="0"/>
+              <a:t>Select with previous</a:t>
+            </a:r>
+          </a:p>
+          <a:p>
+            <a:r>
+              <a:rPr lang="en-US" dirty="0" smtClean="0"/>
+              <a:t>Select with after</a:t>
+            </a:r>
+          </a:p>
+          <a:p>
+            <a:r>
+              <a:rPr lang="en-US" dirty="0" smtClean="0"/>
+              <a:t>Duration and Delay</a:t>
+            </a:r>
+          </a:p>
+          <a:p>
+            <a:r>
+              <a:rPr lang="en-US" dirty="0" smtClean="0"/>
+              <a:t>Kéo thả thời gian bằng tay</a:t>
+            </a:r>
+          </a:p>
+          <a:p>
+            <a:r>
+              <a:rPr lang="en-US" dirty="0" smtClean="0"/>
+              <a:t>Thứ tự xuất hiện animation</a:t>
+            </a:r>
+          </a:p>
+          <a:p>
+            <a:r>
+              <a:rPr lang="en-US" dirty="0"/>
+              <a:t>Complex </a:t>
+            </a:r>
+            <a:r>
+              <a:rPr lang="en-US" dirty="0" smtClean="0"/>
+              <a:t>animations  bằng add Animation</a:t>
+            </a:r>
+            <a:endParaRPr lang="en-US" dirty="0"/>
+          </a:p>
+        </p:txBody>
+      </p:sp>
+    </p:spTree>
+    <p:extLst>
+      <p:ext uri="{BB962C8B-B14F-4D97-AF65-F5344CB8AC3E}">
+        <p14:creationId xmlns:p14="http://schemas.microsoft.com/office/powerpoint/2010/main" val="2131183991"/>
+      </p:ext>
+    </p:extLst>
+  </p:cSld>
+  <p:clrMapOvr>
+    <a:masterClrMapping/>
+  </p:clrMapOvr>
+  <p:timing>
+    <p:tnLst>
+      <p:par>
+        <p:cTn id="1" dur="indefinite" restart="never" nodeType="tmRoot"/>
+      </p:par>
+    </p:tnLst>
+  </p:timing>
+</p:sld>
+</file>
+
+<file path=ppt/slides/slide16.xml><?xml version="1.0" encoding="utf-8"?>
+<p:sld xmlns:a="http://schemas.openxmlformats.org/drawingml/2006/main" xmlns:r="http://schemas.openxmlformats.org/officeDocument/2006/relationships" xmlns:p="http://schemas.openxmlformats.org/presentationml/2006/main">
+  <p:cSld>
+    <p:spTree>
+      <p:nvGrpSpPr>
+        <p:cNvPr id="1" name=""/>
+        <p:cNvGrpSpPr/>
+        <p:nvPr/>
+      </p:nvGrpSpPr>
+      <p:grpSpPr>
+        <a:xfrm>
+          <a:off x="0" y="0"/>
+          <a:ext cx="0" cy="0"/>
+          <a:chOff x="0" y="0"/>
+          <a:chExt cx="0" cy="0"/>
+        </a:xfrm>
+      </p:grpSpPr>
+      <p:sp>
+        <p:nvSpPr>
+          <p:cNvPr id="2" name="Title 1"/>
+          <p:cNvSpPr>
+            <a:spLocks noGrp="1"/>
+          </p:cNvSpPr>
+          <p:nvPr>
+            <p:ph type="title"/>
+          </p:nvPr>
+        </p:nvSpPr>
+        <p:spPr/>
+        <p:txBody>
+          <a:bodyPr/>
+          <a:lstStyle/>
+          <a:p>
+            <a:r>
+              <a:rPr lang="en-US" dirty="0" smtClean="0"/>
+              <a:t>XIX. Advanced animation</a:t>
+            </a:r>
+            <a:r>
+              <a:rPr lang="en-US" dirty="0"/>
+              <a:t> </a:t>
+            </a:r>
+            <a:endParaRPr lang="en-US" dirty="0"/>
+          </a:p>
+        </p:txBody>
+      </p:sp>
+      <p:sp>
+        <p:nvSpPr>
+          <p:cNvPr id="3" name="Content Placeholder 2"/>
+          <p:cNvSpPr>
+            <a:spLocks noGrp="1"/>
+          </p:cNvSpPr>
+          <p:nvPr>
+            <p:ph idx="1"/>
+          </p:nvPr>
+        </p:nvSpPr>
+        <p:spPr/>
+        <p:txBody>
+          <a:bodyPr/>
+          <a:lstStyle/>
+          <a:p>
+            <a:r>
+              <a:rPr lang="en-US" dirty="0" smtClean="0"/>
+              <a:t>Double click 1 thanh trong trang animation plane</a:t>
+            </a:r>
+          </a:p>
+          <a:p>
+            <a:r>
+              <a:rPr lang="en-US" dirty="0" smtClean="0"/>
+              <a:t>Làm mịn cảnh</a:t>
+            </a:r>
+            <a:endParaRPr lang="en-US" dirty="0"/>
+          </a:p>
+        </p:txBody>
+      </p:sp>
+    </p:spTree>
+    <p:extLst>
+      <p:ext uri="{BB962C8B-B14F-4D97-AF65-F5344CB8AC3E}">
+        <p14:creationId xmlns:p14="http://schemas.microsoft.com/office/powerpoint/2010/main" val="3835088556"/>
+      </p:ext>
+    </p:extLst>
+  </p:cSld>
+  <p:clrMapOvr>
+    <a:masterClrMapping/>
+  </p:clrMapOvr>
+  <p:timing>
+    <p:tnLst>
+      <p:par>
+        <p:cTn id="1" dur="indefinite" restart="never" nodeType="tmRoot"/>
+      </p:par>
+    </p:tnLst>
+  </p:timing>
+</p:sld>
+</file>
+
+<file path=ppt/slides/slide17.xml><?xml version="1.0" encoding="utf-8"?>
+<p:sld xmlns:a="http://schemas.openxmlformats.org/drawingml/2006/main" xmlns:r="http://schemas.openxmlformats.org/officeDocument/2006/relationships" xmlns:p="http://schemas.openxmlformats.org/presentationml/2006/main">
+  <p:cSld>
+    <p:spTree>
+      <p:nvGrpSpPr>
+        <p:cNvPr id="1" name=""/>
+        <p:cNvGrpSpPr/>
+        <p:nvPr/>
+      </p:nvGrpSpPr>
+      <p:grpSpPr>
+        <a:xfrm>
+          <a:off x="0" y="0"/>
+          <a:ext cx="0" cy="0"/>
+          <a:chOff x="0" y="0"/>
+          <a:chExt cx="0" cy="0"/>
+        </a:xfrm>
+      </p:grpSpPr>
       <p:pic>
         <p:nvPicPr>
           <p:cNvPr id="2050" name="Picture 2" descr="E:\Download\nature-wallpaper-7461792.jpg"/>
@@ -4213,120 +5389,105 @@
           </a:p>
         </p:txBody>
       </p:sp>
-      <p:grpSp>
-        <p:nvGrpSpPr>
-          <p:cNvPr id="3" name="Group 2"/>
-          <p:cNvGrpSpPr/>
+      <p:sp>
+        <p:nvSpPr>
+          <p:cNvPr id="6" name="Rectangle 5"/>
+          <p:cNvSpPr/>
           <p:nvPr/>
-        </p:nvGrpSpPr>
-        <p:grpSpPr>
-          <a:xfrm>
+        </p:nvSpPr>
+        <p:spPr>
+          <a:xfrm rot="10800000">
             <a:off x="2342439" y="2619375"/>
             <a:ext cx="7639050" cy="1352550"/>
-            <a:chOff x="2476500" y="2552700"/>
-            <a:chExt cx="7639050" cy="1352550"/>
           </a:xfrm>
-        </p:grpSpPr>
-        <p:sp>
-          <p:nvSpPr>
-            <p:cNvPr id="6" name="Rectangle 5"/>
-            <p:cNvSpPr/>
-            <p:nvPr/>
-          </p:nvSpPr>
-          <p:spPr>
-            <a:xfrm rot="10800000">
-              <a:off x="2476500" y="2552700"/>
-              <a:ext cx="7639050" cy="1352550"/>
-            </a:xfrm>
-            <a:prstGeom prst="rect">
-              <a:avLst/>
-            </a:prstGeom>
-            <a:gradFill flip="none" rotWithShape="1">
-              <a:gsLst>
-                <a:gs pos="7000">
-                  <a:srgbClr val="33E49C">
-                    <a:lumMod val="60000"/>
-                    <a:alpha val="39000"/>
-                  </a:srgbClr>
-                </a:gs>
-                <a:gs pos="100000">
-                  <a:srgbClr val="103945"/>
-                </a:gs>
-              </a:gsLst>
-              <a:lin ang="13500000" scaled="1"/>
-              <a:tileRect/>
-            </a:gradFill>
-            <a:ln w="3175">
-              <a:noFill/>
-            </a:ln>
-          </p:spPr>
-          <p:style>
-            <a:lnRef idx="2">
-              <a:schemeClr val="accent1">
-                <a:shade val="50000"/>
-              </a:schemeClr>
-            </a:lnRef>
-            <a:fillRef idx="1">
-              <a:schemeClr val="accent1"/>
-            </a:fillRef>
-            <a:effectRef idx="0">
-              <a:schemeClr val="accent1"/>
-            </a:effectRef>
-            <a:fontRef idx="minor">
-              <a:schemeClr val="lt1"/>
-            </a:fontRef>
-          </p:style>
-          <p:txBody>
-            <a:bodyPr rtlCol="0" anchor="ctr"/>
-            <a:lstStyle/>
-            <a:p>
-              <a:pPr algn="ctr"/>
-              <a:endParaRPr lang="en-US" dirty="0"/>
-            </a:p>
-          </p:txBody>
-        </p:sp>
-        <p:sp>
-          <p:nvSpPr>
-            <p:cNvPr id="2" name="TextBox 1"/>
-            <p:cNvSpPr txBox="1"/>
-            <p:nvPr/>
-          </p:nvSpPr>
-          <p:spPr>
-            <a:xfrm>
-              <a:off x="4476750" y="2905809"/>
-              <a:ext cx="3638550" cy="646331"/>
-            </a:xfrm>
-            <a:prstGeom prst="rect">
-              <a:avLst/>
-            </a:prstGeom>
+          <a:prstGeom prst="rect">
+            <a:avLst/>
+          </a:prstGeom>
+          <a:gradFill flip="none" rotWithShape="1">
+            <a:gsLst>
+              <a:gs pos="7000">
+                <a:srgbClr val="33E49C">
+                  <a:lumMod val="60000"/>
+                  <a:alpha val="39000"/>
+                </a:srgbClr>
+              </a:gs>
+              <a:gs pos="100000">
+                <a:srgbClr val="103945"/>
+              </a:gs>
+            </a:gsLst>
+            <a:lin ang="13500000" scaled="1"/>
+            <a:tileRect/>
+          </a:gradFill>
+          <a:ln w="3175">
             <a:noFill/>
-          </p:spPr>
-          <p:txBody>
-            <a:bodyPr wrap="square" rtlCol="0">
-              <a:spAutoFit/>
-            </a:bodyPr>
-            <a:lstStyle/>
-            <a:p>
-              <a:pPr algn="ctr"/>
-              <a:r>
-                <a:rPr lang="en-US" sz="3600" dirty="0" smtClean="0">
-                  <a:solidFill>
-                    <a:schemeClr val="bg1"/>
-                  </a:solidFill>
-                  <a:latin typeface="Euclid" pitchFamily="18" charset="0"/>
-                </a:rPr>
-                <a:t>Sea – Biển cả</a:t>
-              </a:r>
-              <a:endParaRPr lang="en-US" sz="3600" dirty="0">
+          </a:ln>
+        </p:spPr>
+        <p:style>
+          <a:lnRef idx="2">
+            <a:schemeClr val="accent1">
+              <a:shade val="50000"/>
+            </a:schemeClr>
+          </a:lnRef>
+          <a:fillRef idx="1">
+            <a:schemeClr val="accent1"/>
+          </a:fillRef>
+          <a:effectRef idx="0">
+            <a:schemeClr val="accent1"/>
+          </a:effectRef>
+          <a:fontRef idx="minor">
+            <a:schemeClr val="lt1"/>
+          </a:fontRef>
+        </p:style>
+        <p:txBody>
+          <a:bodyPr rtlCol="0" anchor="ctr"/>
+          <a:lstStyle/>
+          <a:p>
+            <a:pPr algn="ctr"/>
+            <a:endParaRPr lang="en-US" dirty="0"/>
+          </a:p>
+        </p:txBody>
+      </p:sp>
+      <p:sp>
+        <p:nvSpPr>
+          <p:cNvPr id="2" name="TextBox 1"/>
+          <p:cNvSpPr txBox="1"/>
+          <p:nvPr/>
+        </p:nvSpPr>
+        <p:spPr>
+          <a:xfrm>
+            <a:off x="4342689" y="2972484"/>
+            <a:ext cx="3638550" cy="646331"/>
+          </a:xfrm>
+          <a:prstGeom prst="rect">
+            <a:avLst/>
+          </a:prstGeom>
+          <a:noFill/>
+        </p:spPr>
+        <p:txBody>
+          <a:bodyPr wrap="square" rtlCol="0">
+            <a:spAutoFit/>
+          </a:bodyPr>
+          <a:lstStyle/>
+          <a:p>
+            <a:pPr algn="ctr"/>
+            <a:r>
+              <a:rPr lang="en-US" sz="3600" dirty="0" smtClean="0">
                 <a:solidFill>
                   <a:schemeClr val="bg1"/>
                 </a:solidFill>
                 <a:latin typeface="Euclid" pitchFamily="18" charset="0"/>
-              </a:endParaRPr>
-            </a:p>
-          </p:txBody>
-        </p:sp>
-      </p:grpSp>
+              </a:rPr>
+              <a:t>SEA – BIỂN CẢ</a:t>
+            </a:r>
+            <a:endParaRPr lang="en-US" sz="3600" dirty="0">
+              <a:solidFill>
+                <a:schemeClr val="bg1"/>
+              </a:solidFill>
+              <a:latin typeface="Euclid" pitchFamily="18" charset="0"/>
+            </a:endParaRPr>
+          </a:p>
+        </p:txBody>
+      </p:sp>
     </p:spTree>
     <p:extLst>
       <p:ext uri="{BB962C8B-B14F-4D97-AF65-F5344CB8AC3E}">
@@ -4340,14 +5501,175 @@
   <p:timing>
     <p:tnLst>
       <p:par>
-        <p:cTn id="1" dur="indefinite" restart="never" nodeType="tmRoot"/>
+        <p:cTn id="1" dur="indefinite" restart="never" nodeType="tmRoot">
+          <p:childTnLst>
+            <p:seq concurrent="1" nextAc="seek">
+              <p:cTn id="2" dur="indefinite" nodeType="mainSeq">
+                <p:childTnLst>
+                  <p:par>
+                    <p:cTn id="3" fill="hold">
+                      <p:stCondLst>
+                        <p:cond delay="indefinite"/>
+                      </p:stCondLst>
+                      <p:childTnLst>
+                        <p:par>
+                          <p:cTn id="4" fill="hold">
+                            <p:stCondLst>
+                              <p:cond delay="0"/>
+                            </p:stCondLst>
+                            <p:childTnLst>
+                              <p:par>
+                                <p:cTn id="5" presetID="16" presetClass="entr" presetSubtype="37" fill="hold" grpId="0" nodeType="clickEffect">
+                                  <p:stCondLst>
+                                    <p:cond delay="0"/>
+                                  </p:stCondLst>
+                                  <p:childTnLst>
+                                    <p:set>
+                                      <p:cBhvr>
+                                        <p:cTn id="6" dur="1" fill="hold">
+                                          <p:stCondLst>
+                                            <p:cond delay="0"/>
+                                          </p:stCondLst>
+                                        </p:cTn>
+                                        <p:tgtEl>
+                                          <p:spTgt spid="6"/>
+                                        </p:tgtEl>
+                                        <p:attrNameLst>
+                                          <p:attrName>style.visibility</p:attrName>
+                                        </p:attrNameLst>
+                                      </p:cBhvr>
+                                      <p:to>
+                                        <p:strVal val="visible"/>
+                                      </p:to>
+                                    </p:set>
+                                    <p:animEffect transition="in" filter="barn(outVertical)">
+                                      <p:cBhvr>
+                                        <p:cTn id="7" dur="500"/>
+                                        <p:tgtEl>
+                                          <p:spTgt spid="6"/>
+                                        </p:tgtEl>
+                                      </p:cBhvr>
+                                    </p:animEffect>
+                                  </p:childTnLst>
+                                </p:cTn>
+                              </p:par>
+                              <p:par>
+                                <p:cTn id="8" presetID="16" presetClass="entr" presetSubtype="37" fill="hold" nodeType="withEffect">
+                                  <p:stCondLst>
+                                    <p:cond delay="500"/>
+                                  </p:stCondLst>
+                                  <p:iterate type="lt">
+                                    <p:tmPct val="10000"/>
+                                  </p:iterate>
+                                  <p:childTnLst>
+                                    <p:set>
+                                      <p:cBhvr>
+                                        <p:cTn id="9" dur="1" fill="hold">
+                                          <p:stCondLst>
+                                            <p:cond delay="0"/>
+                                          </p:stCondLst>
+                                        </p:cTn>
+                                        <p:tgtEl>
+                                          <p:spTgt spid="2">
+                                            <p:txEl>
+                                              <p:pRg st="0" end="0"/>
+                                            </p:txEl>
+                                          </p:spTgt>
+                                        </p:tgtEl>
+                                        <p:attrNameLst>
+                                          <p:attrName>style.visibility</p:attrName>
+                                        </p:attrNameLst>
+                                      </p:cBhvr>
+                                      <p:to>
+                                        <p:strVal val="visible"/>
+                                      </p:to>
+                                    </p:set>
+                                    <p:animEffect transition="in" filter="barn(outVertical)">
+                                      <p:cBhvr>
+                                        <p:cTn id="10" dur="500"/>
+                                        <p:tgtEl>
+                                          <p:spTgt spid="2">
+                                            <p:txEl>
+                                              <p:pRg st="0" end="0"/>
+                                            </p:txEl>
+                                          </p:spTgt>
+                                        </p:tgtEl>
+                                      </p:cBhvr>
+                                    </p:animEffect>
+                                  </p:childTnLst>
+                                </p:cTn>
+                              </p:par>
+                              <p:par>
+                                <p:cTn id="11" presetID="22" presetClass="entr" presetSubtype="2" fill="hold" grpId="0" nodeType="withEffect">
+                                  <p:stCondLst>
+                                    <p:cond delay="0"/>
+                                  </p:stCondLst>
+                                  <p:childTnLst>
+                                    <p:set>
+                                      <p:cBhvr>
+                                        <p:cTn id="12" dur="1" fill="hold">
+                                          <p:stCondLst>
+                                            <p:cond delay="0"/>
+                                          </p:stCondLst>
+                                        </p:cTn>
+                                        <p:tgtEl>
+                                          <p:spTgt spid="4"/>
+                                        </p:tgtEl>
+                                        <p:attrNameLst>
+                                          <p:attrName>style.visibility</p:attrName>
+                                        </p:attrNameLst>
+                                      </p:cBhvr>
+                                      <p:to>
+                                        <p:strVal val="visible"/>
+                                      </p:to>
+                                    </p:set>
+                                    <p:animEffect transition="in" filter="wipe(right)">
+                                      <p:cBhvr>
+                                        <p:cTn id="13" dur="500"/>
+                                        <p:tgtEl>
+                                          <p:spTgt spid="4"/>
+                                        </p:tgtEl>
+                                      </p:cBhvr>
+                                    </p:animEffect>
+                                  </p:childTnLst>
+                                </p:cTn>
+                              </p:par>
+                            </p:childTnLst>
+                          </p:cTn>
+                        </p:par>
+                      </p:childTnLst>
+                    </p:cTn>
+                  </p:par>
+                </p:childTnLst>
+              </p:cTn>
+              <p:prevCondLst>
+                <p:cond evt="onPrev" delay="0">
+                  <p:tgtEl>
+                    <p:sldTgt/>
+                  </p:tgtEl>
+                </p:cond>
+              </p:prevCondLst>
+              <p:nextCondLst>
+                <p:cond evt="onNext" delay="0">
+                  <p:tgtEl>
+                    <p:sldTgt/>
+                  </p:tgtEl>
+                </p:cond>
+              </p:nextCondLst>
+            </p:seq>
+          </p:childTnLst>
+        </p:cTn>
       </p:par>
     </p:tnLst>
+    <p:bldLst>
+      <p:bldP spid="4" grpId="0" animBg="1"/>
+      <p:bldP spid="6" grpId="0" animBg="1"/>
+    </p:bldLst>
   </p:timing>
 </p:sld>
 </file>
 
-<file path=ppt/slides/slide13.xml><?xml version="1.0" encoding="utf-8"?>
+<file path=ppt/slides/slide18.xml><?xml version="1.0" encoding="utf-8"?>
 <p:sld xmlns:a="http://schemas.openxmlformats.org/drawingml/2006/main" xmlns:r="http://schemas.openxmlformats.org/officeDocument/2006/relationships" xmlns:p="http://schemas.openxmlformats.org/presentationml/2006/main">
   <p:cSld>
     <p:spTree>
@@ -4632,10 +5954,17 @@
   <p:clrMapOvr>
     <a:masterClrMapping/>
   </p:clrMapOvr>
+  <p:timing>
+    <p:tnLst>
+      <p:par>
+        <p:cTn id="1" dur="indefinite" restart="never" nodeType="tmRoot"/>
+      </p:par>
+    </p:tnLst>
+  </p:timing>
 </p:sld>
 </file>
 
-<file path=ppt/slides/slide14.xml><?xml version="1.0" encoding="utf-8"?>
+<file path=ppt/slides/slide19.xml><?xml version="1.0" encoding="utf-8"?>
 <p:sld xmlns:a="http://schemas.openxmlformats.org/drawingml/2006/main" xmlns:r="http://schemas.openxmlformats.org/officeDocument/2006/relationships" xmlns:p="http://schemas.openxmlformats.org/presentationml/2006/main">
   <p:cSld>
     <p:spTree>
@@ -4920,74 +6249,13 @@
   <p:clrMapOvr>
     <a:masterClrMapping/>
   </p:clrMapOvr>
-</p:sld>
-</file>
-
-<file path=ppt/slides/slide15.xml><?xml version="1.0" encoding="utf-8"?>
-<p:sld xmlns:a="http://schemas.openxmlformats.org/drawingml/2006/main" xmlns:r="http://schemas.openxmlformats.org/officeDocument/2006/relationships" xmlns:p="http://schemas.openxmlformats.org/presentationml/2006/main">
-  <p:cSld>
-    <p:spTree>
-      <p:nvGrpSpPr>
-        <p:cNvPr id="1" name=""/>
-        <p:cNvGrpSpPr/>
-        <p:nvPr/>
-      </p:nvGrpSpPr>
-      <p:grpSpPr>
-        <a:xfrm>
-          <a:off x="0" y="0"/>
-          <a:ext cx="0" cy="0"/>
-          <a:chOff x="0" y="0"/>
-          <a:chExt cx="0" cy="0"/>
-        </a:xfrm>
-      </p:grpSpPr>
-      <p:sp>
-        <p:nvSpPr>
-          <p:cNvPr id="2" name="Title 1"/>
-          <p:cNvSpPr>
-            <a:spLocks noGrp="1"/>
-          </p:cNvSpPr>
-          <p:nvPr>
-            <p:ph type="title"/>
-          </p:nvPr>
-        </p:nvSpPr>
-        <p:spPr/>
-        <p:txBody>
-          <a:bodyPr/>
-          <a:lstStyle/>
-          <a:p>
-            <a:endParaRPr lang="en-US"/>
-          </a:p>
-        </p:txBody>
-      </p:sp>
-      <p:sp>
-        <p:nvSpPr>
-          <p:cNvPr id="3" name="Content Placeholder 2"/>
-          <p:cNvSpPr>
-            <a:spLocks noGrp="1"/>
-          </p:cNvSpPr>
-          <p:nvPr>
-            <p:ph idx="1"/>
-          </p:nvPr>
-        </p:nvSpPr>
-        <p:spPr/>
-        <p:txBody>
-          <a:bodyPr/>
-          <a:lstStyle/>
-          <a:p>
-            <a:endParaRPr lang="en-US"/>
-          </a:p>
-        </p:txBody>
-      </p:sp>
-    </p:spTree>
-    <p:extLst>
-      <p:ext uri="{BB962C8B-B14F-4D97-AF65-F5344CB8AC3E}">
-        <p14:creationId xmlns:p14="http://schemas.microsoft.com/office/powerpoint/2010/main" val="2384391590"/>
-      </p:ext>
-    </p:extLst>
-  </p:cSld>
-  <p:clrMapOvr>
-    <a:masterClrMapping/>
-  </p:clrMapOvr>
+  <p:timing>
+    <p:tnLst>
+      <p:par>
+        <p:cTn id="1" dur="indefinite" restart="never" nodeType="tmRoot"/>
+      </p:par>
+    </p:tnLst>
+  </p:timing>
 </p:sld>
 </file>
 
@@ -5401,6 +6669,13 @@
   <p:clrMapOvr>
     <a:masterClrMapping/>
   </p:clrMapOvr>
+  <p:timing>
+    <p:tnLst>
+      <p:par>
+        <p:cTn id="1" dur="indefinite" restart="never" nodeType="tmRoot"/>
+      </p:par>
+    </p:tnLst>
+  </p:timing>
 </p:sld>
 </file>
 
@@ -5577,6 +6852,13 @@
   <p:clrMapOvr>
     <a:masterClrMapping/>
   </p:clrMapOvr>
+  <p:timing>
+    <p:tnLst>
+      <p:par>
+        <p:cTn id="1" dur="indefinite" restart="never" nodeType="tmRoot"/>
+      </p:par>
+    </p:tnLst>
+  </p:timing>
 </p:sld>
 </file>
 
@@ -5730,6 +7012,13 @@
   <p:clrMapOvr>
     <a:masterClrMapping/>
   </p:clrMapOvr>
+  <p:timing>
+    <p:tnLst>
+      <p:par>
+        <p:cTn id="1" dur="indefinite" restart="never" nodeType="tmRoot"/>
+      </p:par>
+    </p:tnLst>
+  </p:timing>
 </p:sld>
 </file>
 
@@ -5832,6 +7121,13 @@
   <p:clrMapOvr>
     <a:masterClrMapping/>
   </p:clrMapOvr>
+  <p:timing>
+    <p:tnLst>
+      <p:par>
+        <p:cTn id="1" dur="indefinite" restart="never" nodeType="tmRoot"/>
+      </p:par>
+    </p:tnLst>
+  </p:timing>
 </p:sld>
 </file>
 
@@ -6016,6 +7312,13 @@
   <p:clrMapOvr>
     <a:masterClrMapping/>
   </p:clrMapOvr>
+  <p:timing>
+    <p:tnLst>
+      <p:par>
+        <p:cTn id="1" dur="indefinite" restart="never" nodeType="tmRoot"/>
+      </p:par>
+    </p:tnLst>
+  </p:timing>
 </p:sld>
 </file>
 
@@ -6274,7 +7577,7 @@
   <a:extraClrSchemeLst/>
   <a:extLst>
     <a:ext uri="{05A4C25C-085E-4340-85A3-A5531E510DB2}">
-      <thm15:themeFamily xmlns="" xmlns:thm15="http://schemas.microsoft.com/office/thememl/2012/main" name="Office Theme" id="{62F939B6-93AF-4DB8-9C6B-D6C7DFDC589F}" vid="{4A3C46E8-61CC-4603-A589-7422A47A8E4A}"/>
+      <thm15:themeFamily xmlns:thm15="http://schemas.microsoft.com/office/thememl/2012/main" name="Office Theme" id="{62F939B6-93AF-4DB8-9C6B-D6C7DFDC589F}" vid="{4A3C46E8-61CC-4603-A589-7422A47A8E4A}"/>
     </a:ext>
   </a:extLst>
 </a:theme>
@@ -6820,7 +8123,7 @@
   <a:extraClrSchemeLst/>
   <a:extLst>
     <a:ext uri="{05A4C25C-085E-4340-85A3-A5531E510DB2}">
-      <thm15:themeFamily xmlns="" xmlns:thm15="http://schemas.microsoft.com/office/thememl/2012/main" name="Office Theme" id="{62F939B6-93AF-4DB8-9C6B-D6C7DFDC589F}" vid="{4A3C46E8-61CC-4603-A589-7422A47A8E4A}"/>
+      <thm15:themeFamily xmlns:thm15="http://schemas.microsoft.com/office/thememl/2012/main" name="Office Theme" id="{62F939B6-93AF-4DB8-9C6B-D6C7DFDC589F}" vid="{4A3C46E8-61CC-4603-A589-7422A47A8E4A}"/>
     </a:ext>
   </a:extLst>
 </a:theme>

</xml_diff>